<commit_message>
Nuovi oggetti XML e tipi (CCK, RAWDATA)
</commit_message>
<xml_diff>
--- a/NOVOMATIC/TicketInfoPoint/TicketInfoPoint & BB.pptx
+++ b/NOVOMATIC/TicketInfoPoint/TicketInfoPoint & BB.pptx
@@ -13,6 +13,8 @@
     <p:sldId id="261" r:id="rId7"/>
     <p:sldId id="262" r:id="rId8"/>
     <p:sldId id="263" r:id="rId9"/>
+    <p:sldId id="264" r:id="rId10"/>
+    <p:sldId id="265" r:id="rId11"/>
   </p:sldIdLst>
   <p:sldSz cx="12192000" cy="6858000"/>
   <p:notesSz cx="6858000" cy="9144000"/>
@@ -111,7 +113,16 @@
       </a:defRPr>
     </a:lvl9pPr>
   </p:defaultTextStyle>
+  <p:extLst>
+    <p:ext uri="{EFAFB233-063F-42B5-8137-9DF3F51BA10A}">
+      <p15:sldGuideLst xmlns:p15="http://schemas.microsoft.com/office/powerpoint/2012/main"/>
+    </p:ext>
+  </p:extLst>
 </p:presentation>
+</file>
+
+<file path=ppt/revisionInfo.xml><?xml version="1.0" encoding="utf-8"?>
+<p1510:revInfo xmlns:a="http://schemas.openxmlformats.org/drawingml/2006/main" xmlns:r="http://schemas.openxmlformats.org/officeDocument/2006/relationships" xmlns:p1510="http://schemas.microsoft.com/office/powerpoint/2015/10/main"/>
 </file>
 
 <file path=ppt/slideLayouts/slideLayout1.xml><?xml version="1.0" encoding="utf-8"?>
@@ -261,7 +272,7 @@
           <a:p>
             <a:fld id="{87D3034E-D632-4871-95FC-EAFB7AD99FAB}" type="datetimeFigureOut">
               <a:rPr lang="it-IT" smtClean="0"/>
-              <a:t>07/02/2018</a:t>
+              <a:t>08/02/2018</a:t>
             </a:fld>
             <a:endParaRPr lang="it-IT"/>
           </a:p>
@@ -459,7 +470,7 @@
           <a:p>
             <a:fld id="{87D3034E-D632-4871-95FC-EAFB7AD99FAB}" type="datetimeFigureOut">
               <a:rPr lang="it-IT" smtClean="0"/>
-              <a:t>07/02/2018</a:t>
+              <a:t>08/02/2018</a:t>
             </a:fld>
             <a:endParaRPr lang="it-IT"/>
           </a:p>
@@ -667,7 +678,7 @@
           <a:p>
             <a:fld id="{87D3034E-D632-4871-95FC-EAFB7AD99FAB}" type="datetimeFigureOut">
               <a:rPr lang="it-IT" smtClean="0"/>
-              <a:t>07/02/2018</a:t>
+              <a:t>08/02/2018</a:t>
             </a:fld>
             <a:endParaRPr lang="it-IT"/>
           </a:p>
@@ -865,7 +876,7 @@
           <a:p>
             <a:fld id="{87D3034E-D632-4871-95FC-EAFB7AD99FAB}" type="datetimeFigureOut">
               <a:rPr lang="it-IT" smtClean="0"/>
-              <a:t>07/02/2018</a:t>
+              <a:t>08/02/2018</a:t>
             </a:fld>
             <a:endParaRPr lang="it-IT"/>
           </a:p>
@@ -1140,7 +1151,7 @@
           <a:p>
             <a:fld id="{87D3034E-D632-4871-95FC-EAFB7AD99FAB}" type="datetimeFigureOut">
               <a:rPr lang="it-IT" smtClean="0"/>
-              <a:t>07/02/2018</a:t>
+              <a:t>08/02/2018</a:t>
             </a:fld>
             <a:endParaRPr lang="it-IT"/>
           </a:p>
@@ -1405,7 +1416,7 @@
           <a:p>
             <a:fld id="{87D3034E-D632-4871-95FC-EAFB7AD99FAB}" type="datetimeFigureOut">
               <a:rPr lang="it-IT" smtClean="0"/>
-              <a:t>07/02/2018</a:t>
+              <a:t>08/02/2018</a:t>
             </a:fld>
             <a:endParaRPr lang="it-IT"/>
           </a:p>
@@ -1817,7 +1828,7 @@
           <a:p>
             <a:fld id="{87D3034E-D632-4871-95FC-EAFB7AD99FAB}" type="datetimeFigureOut">
               <a:rPr lang="it-IT" smtClean="0"/>
-              <a:t>07/02/2018</a:t>
+              <a:t>08/02/2018</a:t>
             </a:fld>
             <a:endParaRPr lang="it-IT"/>
           </a:p>
@@ -1958,7 +1969,7 @@
           <a:p>
             <a:fld id="{87D3034E-D632-4871-95FC-EAFB7AD99FAB}" type="datetimeFigureOut">
               <a:rPr lang="it-IT" smtClean="0"/>
-              <a:t>07/02/2018</a:t>
+              <a:t>08/02/2018</a:t>
             </a:fld>
             <a:endParaRPr lang="it-IT"/>
           </a:p>
@@ -2071,7 +2082,7 @@
           <a:p>
             <a:fld id="{87D3034E-D632-4871-95FC-EAFB7AD99FAB}" type="datetimeFigureOut">
               <a:rPr lang="it-IT" smtClean="0"/>
-              <a:t>07/02/2018</a:t>
+              <a:t>08/02/2018</a:t>
             </a:fld>
             <a:endParaRPr lang="it-IT"/>
           </a:p>
@@ -2382,7 +2393,7 @@
           <a:p>
             <a:fld id="{87D3034E-D632-4871-95FC-EAFB7AD99FAB}" type="datetimeFigureOut">
               <a:rPr lang="it-IT" smtClean="0"/>
-              <a:t>07/02/2018</a:t>
+              <a:t>08/02/2018</a:t>
             </a:fld>
             <a:endParaRPr lang="it-IT"/>
           </a:p>
@@ -2670,7 +2681,7 @@
           <a:p>
             <a:fld id="{87D3034E-D632-4871-95FC-EAFB7AD99FAB}" type="datetimeFigureOut">
               <a:rPr lang="it-IT" smtClean="0"/>
-              <a:t>07/02/2018</a:t>
+              <a:t>08/02/2018</a:t>
             </a:fld>
             <a:endParaRPr lang="it-IT"/>
           </a:p>
@@ -2911,7 +2922,7 @@
           <a:p>
             <a:fld id="{87D3034E-D632-4871-95FC-EAFB7AD99FAB}" type="datetimeFigureOut">
               <a:rPr lang="it-IT" smtClean="0"/>
-              <a:t>07/02/2018</a:t>
+              <a:t>08/02/2018</a:t>
             </a:fld>
             <a:endParaRPr lang="it-IT"/>
           </a:p>
@@ -3470,6 +3481,1283 @@
 </p:sld>
 </file>
 
+<file path=ppt/slides/slide10.xml><?xml version="1.0" encoding="utf-8"?>
+<p:sld xmlns:a="http://schemas.openxmlformats.org/drawingml/2006/main" xmlns:r="http://schemas.openxmlformats.org/officeDocument/2006/relationships" xmlns:p="http://schemas.openxmlformats.org/presentationml/2006/main">
+  <p:cSld>
+    <p:spTree>
+      <p:nvGrpSpPr>
+        <p:cNvPr id="1" name=""/>
+        <p:cNvGrpSpPr/>
+        <p:nvPr/>
+      </p:nvGrpSpPr>
+      <p:grpSpPr>
+        <a:xfrm>
+          <a:off x="0" y="0"/>
+          <a:ext cx="0" cy="0"/>
+          <a:chOff x="0" y="0"/>
+          <a:chExt cx="0" cy="0"/>
+        </a:xfrm>
+      </p:grpSpPr>
+      <p:sp>
+        <p:nvSpPr>
+          <p:cNvPr id="6" name="Titolo 1">
+            <a:extLst>
+              <a:ext uri="{FF2B5EF4-FFF2-40B4-BE49-F238E27FC236}">
+                <a16:creationId xmlns:a16="http://schemas.microsoft.com/office/drawing/2014/main" id="{5485C6CD-2F04-4F2B-9C1D-E2FD5EF7B7F2}"/>
+              </a:ext>
+            </a:extLst>
+          </p:cNvPr>
+          <p:cNvSpPr txBox="1">
+            <a:spLocks/>
+          </p:cNvSpPr>
+          <p:nvPr/>
+        </p:nvSpPr>
+        <p:spPr>
+          <a:xfrm>
+            <a:off x="838200" y="365126"/>
+            <a:ext cx="10515600" cy="387388"/>
+          </a:xfrm>
+          <a:prstGeom prst="rect">
+            <a:avLst/>
+          </a:prstGeom>
+        </p:spPr>
+        <p:txBody>
+          <a:bodyPr>
+            <a:normAutofit fontScale="75000" lnSpcReduction="20000"/>
+          </a:bodyPr>
+          <a:lstStyle>
+            <a:lvl1pPr algn="l" defTabSz="914400" rtl="0" eaLnBrk="1" latinLnBrk="0" hangingPunct="1">
+              <a:lnSpc>
+                <a:spcPct val="90000"/>
+              </a:lnSpc>
+              <a:spcBef>
+                <a:spcPct val="0"/>
+              </a:spcBef>
+              <a:buNone/>
+              <a:defRPr sz="4400" kern="1200">
+                <a:solidFill>
+                  <a:schemeClr val="tx1"/>
+                </a:solidFill>
+                <a:latin typeface="+mj-lt"/>
+                <a:ea typeface="+mj-ea"/>
+                <a:cs typeface="+mj-cs"/>
+              </a:defRPr>
+            </a:lvl1pPr>
+          </a:lstStyle>
+          <a:p>
+            <a:pPr algn="r"/>
+            <a:r>
+              <a:rPr lang="it-IT" sz="3600" dirty="0">
+                <a:solidFill>
+                  <a:srgbClr val="C00000"/>
+                </a:solidFill>
+              </a:rPr>
+              <a:t>Assetto stadio/fase 2 (optimum, opzionale)</a:t>
+            </a:r>
+          </a:p>
+        </p:txBody>
+      </p:sp>
+      <p:sp>
+        <p:nvSpPr>
+          <p:cNvPr id="7" name="Cubo 6">
+            <a:extLst>
+              <a:ext uri="{FF2B5EF4-FFF2-40B4-BE49-F238E27FC236}">
+                <a16:creationId xmlns:a16="http://schemas.microsoft.com/office/drawing/2014/main" id="{6A4274F7-3F74-4EED-9D88-24E274273EC9}"/>
+              </a:ext>
+            </a:extLst>
+          </p:cNvPr>
+          <p:cNvSpPr/>
+          <p:nvPr/>
+        </p:nvSpPr>
+        <p:spPr>
+          <a:xfrm>
+            <a:off x="3298409" y="1430764"/>
+            <a:ext cx="2001744" cy="2585152"/>
+          </a:xfrm>
+          <a:prstGeom prst="cube">
+            <a:avLst/>
+          </a:prstGeom>
+          <a:solidFill>
+            <a:srgbClr val="002060"/>
+          </a:solidFill>
+        </p:spPr>
+        <p:style>
+          <a:lnRef idx="2">
+            <a:schemeClr val="accent1">
+              <a:shade val="50000"/>
+            </a:schemeClr>
+          </a:lnRef>
+          <a:fillRef idx="1">
+            <a:schemeClr val="accent1"/>
+          </a:fillRef>
+          <a:effectRef idx="0">
+            <a:schemeClr val="accent1"/>
+          </a:effectRef>
+          <a:fontRef idx="minor">
+            <a:schemeClr val="lt1"/>
+          </a:fontRef>
+        </p:style>
+        <p:txBody>
+          <a:bodyPr rtlCol="0" anchor="ctr"/>
+          <a:lstStyle/>
+          <a:p>
+            <a:pPr algn="ctr"/>
+            <a:r>
+              <a:rPr lang="it-IT" dirty="0"/>
+              <a:t>CAMPUS</a:t>
+            </a:r>
+          </a:p>
+        </p:txBody>
+      </p:sp>
+      <p:sp>
+        <p:nvSpPr>
+          <p:cNvPr id="8" name="Cilindro 7">
+            <a:extLst>
+              <a:ext uri="{FF2B5EF4-FFF2-40B4-BE49-F238E27FC236}">
+                <a16:creationId xmlns:a16="http://schemas.microsoft.com/office/drawing/2014/main" id="{7C475FAA-70C9-43C3-B4C4-96B1B7F36456}"/>
+              </a:ext>
+            </a:extLst>
+          </p:cNvPr>
+          <p:cNvSpPr/>
+          <p:nvPr/>
+        </p:nvSpPr>
+        <p:spPr>
+          <a:xfrm>
+            <a:off x="5437904" y="4097551"/>
+            <a:ext cx="658096" cy="963941"/>
+          </a:xfrm>
+          <a:prstGeom prst="can">
+            <a:avLst/>
+          </a:prstGeom>
+          <a:solidFill>
+            <a:schemeClr val="accent4">
+              <a:lumMod val="60000"/>
+              <a:lumOff val="40000"/>
+            </a:schemeClr>
+          </a:solidFill>
+        </p:spPr>
+        <p:style>
+          <a:lnRef idx="2">
+            <a:schemeClr val="accent1">
+              <a:shade val="50000"/>
+            </a:schemeClr>
+          </a:lnRef>
+          <a:fillRef idx="1">
+            <a:schemeClr val="accent1"/>
+          </a:fillRef>
+          <a:effectRef idx="0">
+            <a:schemeClr val="accent1"/>
+          </a:effectRef>
+          <a:fontRef idx="minor">
+            <a:schemeClr val="lt1"/>
+          </a:fontRef>
+        </p:style>
+        <p:txBody>
+          <a:bodyPr rtlCol="0" anchor="ctr"/>
+          <a:lstStyle/>
+          <a:p>
+            <a:pPr algn="ctr"/>
+            <a:r>
+              <a:rPr lang="it-IT" sz="1100" dirty="0"/>
+              <a:t>Tickets</a:t>
+            </a:r>
+          </a:p>
+        </p:txBody>
+      </p:sp>
+      <p:sp>
+        <p:nvSpPr>
+          <p:cNvPr id="9" name="Cilindro 8">
+            <a:extLst>
+              <a:ext uri="{FF2B5EF4-FFF2-40B4-BE49-F238E27FC236}">
+                <a16:creationId xmlns:a16="http://schemas.microsoft.com/office/drawing/2014/main" id="{8D95228A-73BD-419B-A313-0D37F1C66D2E}"/>
+              </a:ext>
+            </a:extLst>
+          </p:cNvPr>
+          <p:cNvSpPr/>
+          <p:nvPr/>
+        </p:nvSpPr>
+        <p:spPr>
+          <a:xfrm>
+            <a:off x="2356528" y="4097553"/>
+            <a:ext cx="673432" cy="963941"/>
+          </a:xfrm>
+          <a:prstGeom prst="can">
+            <a:avLst/>
+          </a:prstGeom>
+          <a:solidFill>
+            <a:schemeClr val="accent4">
+              <a:lumMod val="60000"/>
+              <a:lumOff val="40000"/>
+            </a:schemeClr>
+          </a:solidFill>
+        </p:spPr>
+        <p:style>
+          <a:lnRef idx="2">
+            <a:schemeClr val="accent1">
+              <a:shade val="50000"/>
+            </a:schemeClr>
+          </a:lnRef>
+          <a:fillRef idx="1">
+            <a:schemeClr val="accent1"/>
+          </a:fillRef>
+          <a:effectRef idx="0">
+            <a:schemeClr val="accent1"/>
+          </a:effectRef>
+          <a:fontRef idx="minor">
+            <a:schemeClr val="lt1"/>
+          </a:fontRef>
+        </p:style>
+        <p:txBody>
+          <a:bodyPr rtlCol="0" anchor="ctr"/>
+          <a:lstStyle/>
+          <a:p>
+            <a:pPr algn="ctr"/>
+            <a:r>
+              <a:rPr lang="it-IT" sz="1100" dirty="0" err="1"/>
+              <a:t>Raw</a:t>
+            </a:r>
+            <a:endParaRPr lang="it-IT" sz="1100" dirty="0"/>
+          </a:p>
+          <a:p>
+            <a:pPr algn="ctr"/>
+            <a:r>
+              <a:rPr lang="it-IT" sz="1100" dirty="0"/>
+              <a:t>Data</a:t>
+            </a:r>
+          </a:p>
+          <a:p>
+            <a:pPr algn="ctr"/>
+            <a:r>
+              <a:rPr lang="it-IT" sz="1100" dirty="0"/>
+              <a:t>SISAL</a:t>
+            </a:r>
+          </a:p>
+        </p:txBody>
+      </p:sp>
+      <p:sp>
+        <p:nvSpPr>
+          <p:cNvPr id="10" name="Cilindro 9">
+            <a:extLst>
+              <a:ext uri="{FF2B5EF4-FFF2-40B4-BE49-F238E27FC236}">
+                <a16:creationId xmlns:a16="http://schemas.microsoft.com/office/drawing/2014/main" id="{32DD8CBB-BAC0-4140-89BE-8EF9B6C20808}"/>
+              </a:ext>
+            </a:extLst>
+          </p:cNvPr>
+          <p:cNvSpPr/>
+          <p:nvPr/>
+        </p:nvSpPr>
+        <p:spPr>
+          <a:xfrm>
+            <a:off x="3144264" y="4097553"/>
+            <a:ext cx="658097" cy="963941"/>
+          </a:xfrm>
+          <a:prstGeom prst="can">
+            <a:avLst/>
+          </a:prstGeom>
+          <a:solidFill>
+            <a:schemeClr val="accent4">
+              <a:lumMod val="60000"/>
+              <a:lumOff val="40000"/>
+            </a:schemeClr>
+          </a:solidFill>
+        </p:spPr>
+        <p:style>
+          <a:lnRef idx="2">
+            <a:schemeClr val="accent1">
+              <a:shade val="50000"/>
+            </a:schemeClr>
+          </a:lnRef>
+          <a:fillRef idx="1">
+            <a:schemeClr val="accent1"/>
+          </a:fillRef>
+          <a:effectRef idx="0">
+            <a:schemeClr val="accent1"/>
+          </a:effectRef>
+          <a:fontRef idx="minor">
+            <a:schemeClr val="lt1"/>
+          </a:fontRef>
+        </p:style>
+        <p:txBody>
+          <a:bodyPr rtlCol="0" anchor="ctr"/>
+          <a:lstStyle/>
+          <a:p>
+            <a:pPr algn="ctr"/>
+            <a:r>
+              <a:rPr lang="it-IT" sz="1100" dirty="0" err="1"/>
+              <a:t>Raw</a:t>
+            </a:r>
+            <a:endParaRPr lang="it-IT" sz="1100" dirty="0"/>
+          </a:p>
+          <a:p>
+            <a:pPr algn="ctr"/>
+            <a:r>
+              <a:rPr lang="it-IT" sz="1100" dirty="0"/>
+              <a:t>Data</a:t>
+            </a:r>
+          </a:p>
+          <a:p>
+            <a:pPr algn="ctr"/>
+            <a:r>
+              <a:rPr lang="it-IT" sz="1100" dirty="0" err="1"/>
+              <a:t>Gmatica</a:t>
+            </a:r>
+            <a:endParaRPr lang="it-IT" sz="1100" dirty="0"/>
+          </a:p>
+        </p:txBody>
+      </p:sp>
+      <p:sp>
+        <p:nvSpPr>
+          <p:cNvPr id="11" name="Cilindro 10">
+            <a:extLst>
+              <a:ext uri="{FF2B5EF4-FFF2-40B4-BE49-F238E27FC236}">
+                <a16:creationId xmlns:a16="http://schemas.microsoft.com/office/drawing/2014/main" id="{6F5451C8-E9EA-4EC0-A20F-EAEFD8A188F3}"/>
+              </a:ext>
+            </a:extLst>
+          </p:cNvPr>
+          <p:cNvSpPr/>
+          <p:nvPr/>
+        </p:nvSpPr>
+        <p:spPr>
+          <a:xfrm>
+            <a:off x="3885474" y="4097552"/>
+            <a:ext cx="658097" cy="963941"/>
+          </a:xfrm>
+          <a:prstGeom prst="can">
+            <a:avLst/>
+          </a:prstGeom>
+          <a:solidFill>
+            <a:schemeClr val="accent4">
+              <a:lumMod val="60000"/>
+              <a:lumOff val="40000"/>
+            </a:schemeClr>
+          </a:solidFill>
+        </p:spPr>
+        <p:style>
+          <a:lnRef idx="2">
+            <a:schemeClr val="accent1">
+              <a:shade val="50000"/>
+            </a:schemeClr>
+          </a:lnRef>
+          <a:fillRef idx="1">
+            <a:schemeClr val="accent1"/>
+          </a:fillRef>
+          <a:effectRef idx="0">
+            <a:schemeClr val="accent1"/>
+          </a:effectRef>
+          <a:fontRef idx="minor">
+            <a:schemeClr val="lt1"/>
+          </a:fontRef>
+        </p:style>
+        <p:txBody>
+          <a:bodyPr rtlCol="0" anchor="ctr"/>
+          <a:lstStyle/>
+          <a:p>
+            <a:pPr algn="ctr"/>
+            <a:r>
+              <a:rPr lang="it-IT" sz="1100" dirty="0" err="1"/>
+              <a:t>Raw</a:t>
+            </a:r>
+            <a:endParaRPr lang="it-IT" sz="1100" dirty="0"/>
+          </a:p>
+          <a:p>
+            <a:pPr algn="ctr"/>
+            <a:r>
+              <a:rPr lang="it-IT" sz="1100" dirty="0"/>
+              <a:t>Data</a:t>
+            </a:r>
+          </a:p>
+          <a:p>
+            <a:pPr algn="ctr"/>
+            <a:r>
+              <a:rPr lang="it-IT" sz="1100" dirty="0" err="1"/>
+              <a:t>CODERE</a:t>
+            </a:r>
+            <a:endParaRPr lang="it-IT" sz="1100" dirty="0"/>
+          </a:p>
+        </p:txBody>
+      </p:sp>
+      <p:sp>
+        <p:nvSpPr>
+          <p:cNvPr id="12" name="Cilindro 11">
+            <a:extLst>
+              <a:ext uri="{FF2B5EF4-FFF2-40B4-BE49-F238E27FC236}">
+                <a16:creationId xmlns:a16="http://schemas.microsoft.com/office/drawing/2014/main" id="{375C4BA3-F0B2-48A4-842B-240CA80D2612}"/>
+              </a:ext>
+            </a:extLst>
+          </p:cNvPr>
+          <p:cNvSpPr/>
+          <p:nvPr/>
+        </p:nvSpPr>
+        <p:spPr>
+          <a:xfrm>
+            <a:off x="4638355" y="4097551"/>
+            <a:ext cx="658097" cy="963941"/>
+          </a:xfrm>
+          <a:prstGeom prst="can">
+            <a:avLst/>
+          </a:prstGeom>
+          <a:solidFill>
+            <a:schemeClr val="accent4">
+              <a:lumMod val="60000"/>
+              <a:lumOff val="40000"/>
+            </a:schemeClr>
+          </a:solidFill>
+        </p:spPr>
+        <p:style>
+          <a:lnRef idx="2">
+            <a:schemeClr val="accent1">
+              <a:shade val="50000"/>
+            </a:schemeClr>
+          </a:lnRef>
+          <a:fillRef idx="1">
+            <a:schemeClr val="accent1"/>
+          </a:fillRef>
+          <a:effectRef idx="0">
+            <a:schemeClr val="accent1"/>
+          </a:effectRef>
+          <a:fontRef idx="minor">
+            <a:schemeClr val="lt1"/>
+          </a:fontRef>
+        </p:style>
+        <p:txBody>
+          <a:bodyPr rtlCol="0" anchor="ctr"/>
+          <a:lstStyle/>
+          <a:p>
+            <a:pPr algn="ctr"/>
+            <a:r>
+              <a:rPr lang="it-IT" sz="1100" dirty="0" err="1"/>
+              <a:t>Raw</a:t>
+            </a:r>
+            <a:endParaRPr lang="it-IT" sz="1100" dirty="0"/>
+          </a:p>
+          <a:p>
+            <a:pPr algn="ctr"/>
+            <a:r>
+              <a:rPr lang="it-IT" sz="1100" dirty="0"/>
+              <a:t>Data</a:t>
+            </a:r>
+          </a:p>
+          <a:p>
+            <a:pPr algn="ctr"/>
+            <a:r>
+              <a:rPr lang="it-IT" sz="1100" dirty="0"/>
+              <a:t>…</a:t>
+            </a:r>
+          </a:p>
+        </p:txBody>
+      </p:sp>
+      <p:sp>
+        <p:nvSpPr>
+          <p:cNvPr id="17" name="Memoria interna 16">
+            <a:extLst>
+              <a:ext uri="{FF2B5EF4-FFF2-40B4-BE49-F238E27FC236}">
+                <a16:creationId xmlns:a16="http://schemas.microsoft.com/office/drawing/2014/main" id="{CBF7DFF4-9033-4363-AA3B-7809F94247E2}"/>
+              </a:ext>
+            </a:extLst>
+          </p:cNvPr>
+          <p:cNvSpPr/>
+          <p:nvPr/>
+        </p:nvSpPr>
+        <p:spPr>
+          <a:xfrm>
+            <a:off x="8645590" y="3805214"/>
+            <a:ext cx="1377863" cy="1880212"/>
+          </a:xfrm>
+          <a:prstGeom prst="flowChartInternalStorage">
+            <a:avLst/>
+          </a:prstGeom>
+        </p:spPr>
+        <p:style>
+          <a:lnRef idx="2">
+            <a:schemeClr val="accent1">
+              <a:shade val="50000"/>
+            </a:schemeClr>
+          </a:lnRef>
+          <a:fillRef idx="1">
+            <a:schemeClr val="accent1"/>
+          </a:fillRef>
+          <a:effectRef idx="0">
+            <a:schemeClr val="accent1"/>
+          </a:effectRef>
+          <a:fontRef idx="minor">
+            <a:schemeClr val="lt1"/>
+          </a:fontRef>
+        </p:style>
+        <p:txBody>
+          <a:bodyPr rtlCol="0" anchor="ctr"/>
+          <a:lstStyle/>
+          <a:p>
+            <a:pPr algn="ctr"/>
+            <a:r>
+              <a:rPr lang="it-IT" dirty="0" err="1"/>
+              <a:t>Requests</a:t>
+            </a:r>
+            <a:endParaRPr lang="it-IT" dirty="0"/>
+          </a:p>
+          <a:p>
+            <a:pPr algn="ctr"/>
+            <a:endParaRPr lang="it-IT" dirty="0"/>
+          </a:p>
+          <a:p>
+            <a:pPr algn="ctr"/>
+            <a:endParaRPr lang="it-IT" dirty="0"/>
+          </a:p>
+          <a:p>
+            <a:pPr algn="ctr"/>
+            <a:endParaRPr lang="it-IT" dirty="0"/>
+          </a:p>
+          <a:p>
+            <a:pPr algn="ctr"/>
+            <a:endParaRPr lang="it-IT" dirty="0"/>
+          </a:p>
+          <a:p>
+            <a:pPr algn="ctr"/>
+            <a:endParaRPr lang="it-IT" dirty="0"/>
+          </a:p>
+          <a:p>
+            <a:pPr algn="ctr"/>
+            <a:endParaRPr lang="it-IT" dirty="0"/>
+          </a:p>
+          <a:p>
+            <a:pPr algn="ctr"/>
+            <a:endParaRPr lang="it-IT" dirty="0"/>
+          </a:p>
+        </p:txBody>
+      </p:sp>
+      <p:sp>
+        <p:nvSpPr>
+          <p:cNvPr id="18" name="Rettangolo smussato 17">
+            <a:extLst>
+              <a:ext uri="{FF2B5EF4-FFF2-40B4-BE49-F238E27FC236}">
+                <a16:creationId xmlns:a16="http://schemas.microsoft.com/office/drawing/2014/main" id="{CE30B29B-469F-41A4-A37D-BD45F73817BA}"/>
+              </a:ext>
+            </a:extLst>
+          </p:cNvPr>
+          <p:cNvSpPr/>
+          <p:nvPr/>
+        </p:nvSpPr>
+        <p:spPr>
+          <a:xfrm>
+            <a:off x="7998275" y="2011094"/>
+            <a:ext cx="2672492" cy="1481372"/>
+          </a:xfrm>
+          <a:prstGeom prst="bevel">
+            <a:avLst/>
+          </a:prstGeom>
+        </p:spPr>
+        <p:style>
+          <a:lnRef idx="2">
+            <a:schemeClr val="accent1">
+              <a:shade val="50000"/>
+            </a:schemeClr>
+          </a:lnRef>
+          <a:fillRef idx="1">
+            <a:schemeClr val="accent1"/>
+          </a:fillRef>
+          <a:effectRef idx="0">
+            <a:schemeClr val="accent1"/>
+          </a:effectRef>
+          <a:fontRef idx="minor">
+            <a:schemeClr val="lt1"/>
+          </a:fontRef>
+        </p:style>
+        <p:txBody>
+          <a:bodyPr rtlCol="0" anchor="ctr"/>
+          <a:lstStyle/>
+          <a:p>
+            <a:pPr algn="ctr"/>
+            <a:r>
+              <a:rPr lang="it-IT" dirty="0"/>
+              <a:t>TicketInfoPoint</a:t>
+            </a:r>
+          </a:p>
+          <a:p>
+            <a:pPr algn="ctr"/>
+            <a:r>
+              <a:rPr lang="it-IT" dirty="0"/>
+              <a:t>(TIP)</a:t>
+            </a:r>
+          </a:p>
+        </p:txBody>
+      </p:sp>
+      <p:cxnSp>
+        <p:nvCxnSpPr>
+          <p:cNvPr id="19" name="Connettore 2 18">
+            <a:extLst>
+              <a:ext uri="{FF2B5EF4-FFF2-40B4-BE49-F238E27FC236}">
+                <a16:creationId xmlns:a16="http://schemas.microsoft.com/office/drawing/2014/main" id="{27FF3541-1ED2-4D12-9D8C-F0FC64461964}"/>
+              </a:ext>
+            </a:extLst>
+          </p:cNvPr>
+          <p:cNvCxnSpPr>
+            <a:stCxn id="18" idx="2"/>
+            <a:endCxn id="17" idx="0"/>
+          </p:cNvCxnSpPr>
+          <p:nvPr/>
+        </p:nvCxnSpPr>
+        <p:spPr>
+          <a:xfrm>
+            <a:off x="9334521" y="3492466"/>
+            <a:ext cx="1" cy="312748"/>
+          </a:xfrm>
+          <a:prstGeom prst="straightConnector1">
+            <a:avLst/>
+          </a:prstGeom>
+          <a:ln>
+            <a:tailEnd type="triangle"/>
+          </a:ln>
+        </p:spPr>
+        <p:style>
+          <a:lnRef idx="1">
+            <a:schemeClr val="accent1"/>
+          </a:lnRef>
+          <a:fillRef idx="0">
+            <a:schemeClr val="accent1"/>
+          </a:fillRef>
+          <a:effectRef idx="0">
+            <a:schemeClr val="accent1"/>
+          </a:effectRef>
+          <a:fontRef idx="minor">
+            <a:schemeClr val="tx1"/>
+          </a:fontRef>
+        </p:style>
+      </p:cxnSp>
+      <p:sp>
+        <p:nvSpPr>
+          <p:cNvPr id="20" name="Cilindro 19">
+            <a:extLst>
+              <a:ext uri="{FF2B5EF4-FFF2-40B4-BE49-F238E27FC236}">
+                <a16:creationId xmlns:a16="http://schemas.microsoft.com/office/drawing/2014/main" id="{8AF037A2-AD26-4BE2-ACAE-03D972ECFA45}"/>
+              </a:ext>
+            </a:extLst>
+          </p:cNvPr>
+          <p:cNvSpPr/>
+          <p:nvPr/>
+        </p:nvSpPr>
+        <p:spPr>
+          <a:xfrm>
+            <a:off x="4874816" y="2195296"/>
+            <a:ext cx="658097" cy="963941"/>
+          </a:xfrm>
+          <a:prstGeom prst="can">
+            <a:avLst/>
+          </a:prstGeom>
+          <a:solidFill>
+            <a:schemeClr val="accent4">
+              <a:lumMod val="20000"/>
+              <a:lumOff val="80000"/>
+            </a:schemeClr>
+          </a:solidFill>
+        </p:spPr>
+        <p:style>
+          <a:lnRef idx="2">
+            <a:schemeClr val="accent1">
+              <a:shade val="50000"/>
+            </a:schemeClr>
+          </a:lnRef>
+          <a:fillRef idx="1">
+            <a:schemeClr val="accent1"/>
+          </a:fillRef>
+          <a:effectRef idx="0">
+            <a:schemeClr val="accent1"/>
+          </a:effectRef>
+          <a:fontRef idx="minor">
+            <a:schemeClr val="lt1"/>
+          </a:fontRef>
+        </p:style>
+        <p:txBody>
+          <a:bodyPr rtlCol="0" anchor="ctr"/>
+          <a:lstStyle/>
+          <a:p>
+            <a:pPr algn="ctr"/>
+            <a:r>
+              <a:rPr lang="it-IT" sz="800" b="1" dirty="0">
+                <a:solidFill>
+                  <a:schemeClr val="tx1"/>
+                </a:solidFill>
+              </a:rPr>
+              <a:t>Ticket</a:t>
+            </a:r>
+          </a:p>
+          <a:p>
+            <a:pPr algn="ctr"/>
+            <a:r>
+              <a:rPr lang="it-IT" sz="800" b="1" dirty="0">
+                <a:solidFill>
+                  <a:schemeClr val="tx1"/>
+                </a:solidFill>
+              </a:rPr>
+              <a:t>Info</a:t>
+            </a:r>
+          </a:p>
+          <a:p>
+            <a:pPr algn="ctr"/>
+            <a:r>
+              <a:rPr lang="it-IT" sz="800" b="1" dirty="0">
+                <a:solidFill>
+                  <a:schemeClr val="tx1"/>
+                </a:solidFill>
+              </a:rPr>
+              <a:t>Point</a:t>
+            </a:r>
+          </a:p>
+          <a:p>
+            <a:pPr algn="ctr"/>
+            <a:r>
+              <a:rPr lang="it-IT" sz="800" b="1" dirty="0">
+                <a:solidFill>
+                  <a:schemeClr val="tx1"/>
+                </a:solidFill>
+              </a:rPr>
+              <a:t>DB</a:t>
+            </a:r>
+          </a:p>
+        </p:txBody>
+      </p:sp>
+      <p:sp>
+        <p:nvSpPr>
+          <p:cNvPr id="22" name="Documento multiplo 21">
+            <a:extLst>
+              <a:ext uri="{FF2B5EF4-FFF2-40B4-BE49-F238E27FC236}">
+                <a16:creationId xmlns:a16="http://schemas.microsoft.com/office/drawing/2014/main" id="{1701C325-0DC1-47F8-8E68-B1878B0E9B7B}"/>
+              </a:ext>
+            </a:extLst>
+          </p:cNvPr>
+          <p:cNvSpPr/>
+          <p:nvPr/>
+        </p:nvSpPr>
+        <p:spPr>
+          <a:xfrm>
+            <a:off x="5475482" y="2487086"/>
+            <a:ext cx="658096" cy="466032"/>
+          </a:xfrm>
+          <a:prstGeom prst="flowChartMultidocument">
+            <a:avLst/>
+          </a:prstGeom>
+          <a:solidFill>
+            <a:schemeClr val="accent2">
+              <a:lumMod val="75000"/>
+            </a:schemeClr>
+          </a:solidFill>
+          <a:ln>
+            <a:solidFill>
+              <a:schemeClr val="accent2">
+                <a:lumMod val="40000"/>
+                <a:lumOff val="60000"/>
+              </a:schemeClr>
+            </a:solidFill>
+          </a:ln>
+        </p:spPr>
+        <p:style>
+          <a:lnRef idx="2">
+            <a:schemeClr val="accent1">
+              <a:shade val="50000"/>
+            </a:schemeClr>
+          </a:lnRef>
+          <a:fillRef idx="1">
+            <a:schemeClr val="accent1"/>
+          </a:fillRef>
+          <a:effectRef idx="0">
+            <a:schemeClr val="accent1"/>
+          </a:effectRef>
+          <a:fontRef idx="minor">
+            <a:schemeClr val="lt1"/>
+          </a:fontRef>
+        </p:style>
+        <p:txBody>
+          <a:bodyPr rtlCol="0" anchor="ctr"/>
+          <a:lstStyle/>
+          <a:p>
+            <a:pPr algn="ctr"/>
+            <a:r>
+              <a:rPr lang="it-IT" b="1" dirty="0" err="1"/>
+              <a:t>T2U</a:t>
+            </a:r>
+            <a:endParaRPr lang="it-IT" b="1" dirty="0"/>
+          </a:p>
+        </p:txBody>
+      </p:sp>
+      <p:cxnSp>
+        <p:nvCxnSpPr>
+          <p:cNvPr id="23" name="Connettore a gomito 22">
+            <a:extLst>
+              <a:ext uri="{FF2B5EF4-FFF2-40B4-BE49-F238E27FC236}">
+                <a16:creationId xmlns:a16="http://schemas.microsoft.com/office/drawing/2014/main" id="{FBAD616E-FA28-402D-A176-F43A2898921F}"/>
+              </a:ext>
+            </a:extLst>
+          </p:cNvPr>
+          <p:cNvCxnSpPr>
+            <a:cxnSpLocks/>
+            <a:stCxn id="22" idx="2"/>
+            <a:endCxn id="9" idx="1"/>
+          </p:cNvCxnSpPr>
+          <p:nvPr/>
+        </p:nvCxnSpPr>
+        <p:spPr>
+          <a:xfrm rot="5400000">
+            <a:off x="3644964" y="1983749"/>
+            <a:ext cx="1162084" cy="3065524"/>
+          </a:xfrm>
+          <a:prstGeom prst="bentConnector3">
+            <a:avLst>
+              <a:gd name="adj1" fmla="val 50000"/>
+            </a:avLst>
+          </a:prstGeom>
+          <a:ln>
+            <a:solidFill>
+              <a:schemeClr val="accent2">
+                <a:lumMod val="75000"/>
+              </a:schemeClr>
+            </a:solidFill>
+            <a:headEnd type="triangle"/>
+            <a:tailEnd type="triangle"/>
+          </a:ln>
+        </p:spPr>
+        <p:style>
+          <a:lnRef idx="1">
+            <a:schemeClr val="accent1"/>
+          </a:lnRef>
+          <a:fillRef idx="0">
+            <a:schemeClr val="accent1"/>
+          </a:fillRef>
+          <a:effectRef idx="0">
+            <a:schemeClr val="accent1"/>
+          </a:effectRef>
+          <a:fontRef idx="minor">
+            <a:schemeClr val="tx1"/>
+          </a:fontRef>
+        </p:style>
+      </p:cxnSp>
+      <p:cxnSp>
+        <p:nvCxnSpPr>
+          <p:cNvPr id="28" name="Connettore a gomito 27">
+            <a:extLst>
+              <a:ext uri="{FF2B5EF4-FFF2-40B4-BE49-F238E27FC236}">
+                <a16:creationId xmlns:a16="http://schemas.microsoft.com/office/drawing/2014/main" id="{F08487A1-4A06-4C8A-90F1-787D849A1658}"/>
+              </a:ext>
+            </a:extLst>
+          </p:cNvPr>
+          <p:cNvCxnSpPr>
+            <a:cxnSpLocks/>
+            <a:stCxn id="22" idx="2"/>
+            <a:endCxn id="10" idx="1"/>
+          </p:cNvCxnSpPr>
+          <p:nvPr/>
+        </p:nvCxnSpPr>
+        <p:spPr>
+          <a:xfrm rot="5400000">
+            <a:off x="4034999" y="2373784"/>
+            <a:ext cx="1162084" cy="2285455"/>
+          </a:xfrm>
+          <a:prstGeom prst="bentConnector3">
+            <a:avLst>
+              <a:gd name="adj1" fmla="val 50000"/>
+            </a:avLst>
+          </a:prstGeom>
+          <a:ln>
+            <a:solidFill>
+              <a:schemeClr val="accent2">
+                <a:lumMod val="75000"/>
+              </a:schemeClr>
+            </a:solidFill>
+            <a:headEnd type="triangle"/>
+            <a:tailEnd type="triangle"/>
+          </a:ln>
+        </p:spPr>
+        <p:style>
+          <a:lnRef idx="1">
+            <a:schemeClr val="accent1"/>
+          </a:lnRef>
+          <a:fillRef idx="0">
+            <a:schemeClr val="accent1"/>
+          </a:fillRef>
+          <a:effectRef idx="0">
+            <a:schemeClr val="accent1"/>
+          </a:effectRef>
+          <a:fontRef idx="minor">
+            <a:schemeClr val="tx1"/>
+          </a:fontRef>
+        </p:style>
+      </p:cxnSp>
+      <p:cxnSp>
+        <p:nvCxnSpPr>
+          <p:cNvPr id="29" name="Connettore a gomito 28">
+            <a:extLst>
+              <a:ext uri="{FF2B5EF4-FFF2-40B4-BE49-F238E27FC236}">
+                <a16:creationId xmlns:a16="http://schemas.microsoft.com/office/drawing/2014/main" id="{59FCE685-1CA6-4AFA-8BA5-BEA5360DD085}"/>
+              </a:ext>
+            </a:extLst>
+          </p:cNvPr>
+          <p:cNvCxnSpPr>
+            <a:cxnSpLocks/>
+            <a:stCxn id="22" idx="2"/>
+            <a:endCxn id="11" idx="1"/>
+          </p:cNvCxnSpPr>
+          <p:nvPr/>
+        </p:nvCxnSpPr>
+        <p:spPr>
+          <a:xfrm rot="5400000">
+            <a:off x="4405605" y="2744388"/>
+            <a:ext cx="1162083" cy="1544245"/>
+          </a:xfrm>
+          <a:prstGeom prst="bentConnector3">
+            <a:avLst>
+              <a:gd name="adj1" fmla="val 50000"/>
+            </a:avLst>
+          </a:prstGeom>
+          <a:ln>
+            <a:solidFill>
+              <a:schemeClr val="accent2">
+                <a:lumMod val="75000"/>
+              </a:schemeClr>
+            </a:solidFill>
+            <a:headEnd type="triangle"/>
+            <a:tailEnd type="triangle"/>
+          </a:ln>
+        </p:spPr>
+        <p:style>
+          <a:lnRef idx="1">
+            <a:schemeClr val="accent1"/>
+          </a:lnRef>
+          <a:fillRef idx="0">
+            <a:schemeClr val="accent1"/>
+          </a:fillRef>
+          <a:effectRef idx="0">
+            <a:schemeClr val="accent1"/>
+          </a:effectRef>
+          <a:fontRef idx="minor">
+            <a:schemeClr val="tx1"/>
+          </a:fontRef>
+        </p:style>
+      </p:cxnSp>
+      <p:cxnSp>
+        <p:nvCxnSpPr>
+          <p:cNvPr id="30" name="Connettore a gomito 29">
+            <a:extLst>
+              <a:ext uri="{FF2B5EF4-FFF2-40B4-BE49-F238E27FC236}">
+                <a16:creationId xmlns:a16="http://schemas.microsoft.com/office/drawing/2014/main" id="{B665C69B-6142-48EC-98B5-D98F8157BF07}"/>
+              </a:ext>
+            </a:extLst>
+          </p:cNvPr>
+          <p:cNvCxnSpPr>
+            <a:cxnSpLocks/>
+            <a:stCxn id="22" idx="2"/>
+            <a:endCxn id="12" idx="1"/>
+          </p:cNvCxnSpPr>
+          <p:nvPr/>
+        </p:nvCxnSpPr>
+        <p:spPr>
+          <a:xfrm rot="5400000">
+            <a:off x="4782045" y="3120828"/>
+            <a:ext cx="1162082" cy="791364"/>
+          </a:xfrm>
+          <a:prstGeom prst="bentConnector3">
+            <a:avLst>
+              <a:gd name="adj1" fmla="val 50000"/>
+            </a:avLst>
+          </a:prstGeom>
+          <a:ln>
+            <a:solidFill>
+              <a:schemeClr val="accent2">
+                <a:lumMod val="75000"/>
+              </a:schemeClr>
+            </a:solidFill>
+            <a:headEnd type="triangle"/>
+            <a:tailEnd type="triangle"/>
+          </a:ln>
+        </p:spPr>
+        <p:style>
+          <a:lnRef idx="1">
+            <a:schemeClr val="accent1"/>
+          </a:lnRef>
+          <a:fillRef idx="0">
+            <a:schemeClr val="accent1"/>
+          </a:fillRef>
+          <a:effectRef idx="0">
+            <a:schemeClr val="accent1"/>
+          </a:effectRef>
+          <a:fontRef idx="minor">
+            <a:schemeClr val="tx1"/>
+          </a:fontRef>
+        </p:style>
+      </p:cxnSp>
+      <p:sp>
+        <p:nvSpPr>
+          <p:cNvPr id="35" name="Bolla: nuvola 34">
+            <a:extLst>
+              <a:ext uri="{FF2B5EF4-FFF2-40B4-BE49-F238E27FC236}">
+                <a16:creationId xmlns:a16="http://schemas.microsoft.com/office/drawing/2014/main" id="{98044CCB-2E46-4E30-BF19-14D91299EBA3}"/>
+              </a:ext>
+            </a:extLst>
+          </p:cNvPr>
+          <p:cNvSpPr/>
+          <p:nvPr/>
+        </p:nvSpPr>
+        <p:spPr>
+          <a:xfrm>
+            <a:off x="6043843" y="1903510"/>
+            <a:ext cx="1183885" cy="583572"/>
+          </a:xfrm>
+          <a:prstGeom prst="cloudCallout">
+            <a:avLst>
+              <a:gd name="adj1" fmla="val -51546"/>
+              <a:gd name="adj2" fmla="val 73413"/>
+            </a:avLst>
+          </a:prstGeom>
+          <a:solidFill>
+            <a:srgbClr val="92D050"/>
+          </a:solidFill>
+        </p:spPr>
+        <p:style>
+          <a:lnRef idx="2">
+            <a:schemeClr val="accent1">
+              <a:shade val="50000"/>
+            </a:schemeClr>
+          </a:lnRef>
+          <a:fillRef idx="1">
+            <a:schemeClr val="accent1"/>
+          </a:fillRef>
+          <a:effectRef idx="0">
+            <a:schemeClr val="accent1"/>
+          </a:effectRef>
+          <a:fontRef idx="minor">
+            <a:schemeClr val="lt1"/>
+          </a:fontRef>
+        </p:style>
+        <p:txBody>
+          <a:bodyPr rtlCol="0" anchor="ctr"/>
+          <a:lstStyle/>
+          <a:p>
+            <a:pPr algn="ctr"/>
+            <a:r>
+              <a:rPr lang="it-IT" sz="800" dirty="0"/>
+              <a:t>high speed</a:t>
+            </a:r>
+          </a:p>
+          <a:p>
+            <a:pPr algn="ctr"/>
+            <a:r>
+              <a:rPr lang="it-IT" sz="800" dirty="0"/>
+              <a:t>volatile</a:t>
+            </a:r>
+          </a:p>
+          <a:p>
+            <a:pPr algn="ctr"/>
+            <a:r>
+              <a:rPr lang="it-IT" sz="800" dirty="0"/>
+              <a:t>XML objects</a:t>
+            </a:r>
+          </a:p>
+        </p:txBody>
+      </p:sp>
+      <p:cxnSp>
+        <p:nvCxnSpPr>
+          <p:cNvPr id="42" name="Connettore a gomito 41">
+            <a:extLst>
+              <a:ext uri="{FF2B5EF4-FFF2-40B4-BE49-F238E27FC236}">
+                <a16:creationId xmlns:a16="http://schemas.microsoft.com/office/drawing/2014/main" id="{7CC71F7D-1903-4FC4-8659-23BE9DA02934}"/>
+              </a:ext>
+            </a:extLst>
+          </p:cNvPr>
+          <p:cNvCxnSpPr>
+            <a:cxnSpLocks/>
+            <a:stCxn id="8" idx="1"/>
+            <a:endCxn id="22" idx="2"/>
+          </p:cNvCxnSpPr>
+          <p:nvPr/>
+        </p:nvCxnSpPr>
+        <p:spPr>
+          <a:xfrm rot="16200000" flipV="1">
+            <a:off x="5181819" y="3512418"/>
+            <a:ext cx="1162082" cy="8184"/>
+          </a:xfrm>
+          <a:prstGeom prst="bentConnector3">
+            <a:avLst>
+              <a:gd name="adj1" fmla="val 50000"/>
+            </a:avLst>
+          </a:prstGeom>
+          <a:ln>
+            <a:solidFill>
+              <a:schemeClr val="accent2">
+                <a:lumMod val="75000"/>
+              </a:schemeClr>
+            </a:solidFill>
+            <a:headEnd type="triangle"/>
+            <a:tailEnd type="triangle"/>
+          </a:ln>
+        </p:spPr>
+        <p:style>
+          <a:lnRef idx="1">
+            <a:schemeClr val="accent1"/>
+          </a:lnRef>
+          <a:fillRef idx="0">
+            <a:schemeClr val="accent1"/>
+          </a:fillRef>
+          <a:effectRef idx="0">
+            <a:schemeClr val="accent1"/>
+          </a:effectRef>
+          <a:fontRef idx="minor">
+            <a:schemeClr val="tx1"/>
+          </a:fontRef>
+        </p:style>
+      </p:cxnSp>
+      <p:cxnSp>
+        <p:nvCxnSpPr>
+          <p:cNvPr id="43" name="Connettore a gomito 42">
+            <a:extLst>
+              <a:ext uri="{FF2B5EF4-FFF2-40B4-BE49-F238E27FC236}">
+                <a16:creationId xmlns:a16="http://schemas.microsoft.com/office/drawing/2014/main" id="{7B24094E-F44E-4F4B-97AD-B41749F18AC9}"/>
+              </a:ext>
+            </a:extLst>
+          </p:cNvPr>
+          <p:cNvCxnSpPr>
+            <a:cxnSpLocks/>
+            <a:stCxn id="22" idx="3"/>
+            <a:endCxn id="17" idx="1"/>
+          </p:cNvCxnSpPr>
+          <p:nvPr/>
+        </p:nvCxnSpPr>
+        <p:spPr>
+          <a:xfrm>
+            <a:off x="6133578" y="2720102"/>
+            <a:ext cx="2512012" cy="2025218"/>
+          </a:xfrm>
+          <a:prstGeom prst="bentConnector3">
+            <a:avLst>
+              <a:gd name="adj1" fmla="val 50000"/>
+            </a:avLst>
+          </a:prstGeom>
+          <a:ln>
+            <a:solidFill>
+              <a:schemeClr val="accent2">
+                <a:lumMod val="75000"/>
+              </a:schemeClr>
+            </a:solidFill>
+            <a:headEnd type="triangle"/>
+            <a:tailEnd type="triangle"/>
+          </a:ln>
+        </p:spPr>
+        <p:style>
+          <a:lnRef idx="1">
+            <a:schemeClr val="accent1"/>
+          </a:lnRef>
+          <a:fillRef idx="0">
+            <a:schemeClr val="accent1"/>
+          </a:fillRef>
+          <a:effectRef idx="0">
+            <a:schemeClr val="accent1"/>
+          </a:effectRef>
+          <a:fontRef idx="minor">
+            <a:schemeClr val="tx1"/>
+          </a:fontRef>
+        </p:style>
+      </p:cxnSp>
+      <p:sp>
+        <p:nvSpPr>
+          <p:cNvPr id="68" name="Freccia a destra 67">
+            <a:extLst>
+              <a:ext uri="{FF2B5EF4-FFF2-40B4-BE49-F238E27FC236}">
+                <a16:creationId xmlns:a16="http://schemas.microsoft.com/office/drawing/2014/main" id="{F4E5D9A2-1A4D-45F2-BF63-95B711AE1209}"/>
+              </a:ext>
+            </a:extLst>
+          </p:cNvPr>
+          <p:cNvSpPr/>
+          <p:nvPr/>
+        </p:nvSpPr>
+        <p:spPr>
+          <a:xfrm>
+            <a:off x="8867476" y="1118158"/>
+            <a:ext cx="1155977" cy="787400"/>
+          </a:xfrm>
+          <a:prstGeom prst="rightArrow">
+            <a:avLst/>
+          </a:prstGeom>
+        </p:spPr>
+        <p:style>
+          <a:lnRef idx="2">
+            <a:schemeClr val="accent1">
+              <a:shade val="50000"/>
+            </a:schemeClr>
+          </a:lnRef>
+          <a:fillRef idx="1">
+            <a:schemeClr val="accent1"/>
+          </a:fillRef>
+          <a:effectRef idx="0">
+            <a:schemeClr val="accent1"/>
+          </a:effectRef>
+          <a:fontRef idx="minor">
+            <a:schemeClr val="lt1"/>
+          </a:fontRef>
+        </p:style>
+        <p:txBody>
+          <a:bodyPr rtlCol="0" anchor="ctr"/>
+          <a:lstStyle/>
+          <a:p>
+            <a:pPr algn="ctr"/>
+            <a:r>
+              <a:rPr lang="it-IT" dirty="0"/>
+              <a:t>EXPORT</a:t>
+            </a:r>
+          </a:p>
+        </p:txBody>
+      </p:sp>
+      <p:cxnSp>
+        <p:nvCxnSpPr>
+          <p:cNvPr id="70" name="Connettore 2 69">
+            <a:extLst>
+              <a:ext uri="{FF2B5EF4-FFF2-40B4-BE49-F238E27FC236}">
+                <a16:creationId xmlns:a16="http://schemas.microsoft.com/office/drawing/2014/main" id="{EF83C3C6-E803-40AB-8159-9745F1F45765}"/>
+              </a:ext>
+            </a:extLst>
+          </p:cNvPr>
+          <p:cNvCxnSpPr>
+            <a:stCxn id="18" idx="6"/>
+          </p:cNvCxnSpPr>
+          <p:nvPr/>
+        </p:nvCxnSpPr>
+        <p:spPr>
+          <a:xfrm flipV="1">
+            <a:off x="9334521" y="1719308"/>
+            <a:ext cx="0" cy="291786"/>
+          </a:xfrm>
+          <a:prstGeom prst="straightConnector1">
+            <a:avLst/>
+          </a:prstGeom>
+          <a:ln>
+            <a:tailEnd type="triangle"/>
+          </a:ln>
+        </p:spPr>
+        <p:style>
+          <a:lnRef idx="1">
+            <a:schemeClr val="accent1"/>
+          </a:lnRef>
+          <a:fillRef idx="0">
+            <a:schemeClr val="accent1"/>
+          </a:fillRef>
+          <a:effectRef idx="0">
+            <a:schemeClr val="accent1"/>
+          </a:effectRef>
+          <a:fontRef idx="minor">
+            <a:schemeClr val="tx1"/>
+          </a:fontRef>
+        </p:style>
+      </p:cxnSp>
+    </p:spTree>
+    <p:extLst>
+      <p:ext uri="{BB962C8B-B14F-4D97-AF65-F5344CB8AC3E}">
+        <p14:creationId xmlns:p14="http://schemas.microsoft.com/office/powerpoint/2010/main" val="2027348033"/>
+      </p:ext>
+    </p:extLst>
+  </p:cSld>
+  <p:clrMapOvr>
+    <a:masterClrMapping/>
+  </p:clrMapOvr>
+  <p:transition spd="slow">
+    <p:cover/>
+  </p:transition>
+</p:sld>
+</file>
+
 <file path=ppt/slides/slide2.xml><?xml version="1.0" encoding="utf-8"?>
 <p:sld xmlns:a="http://schemas.openxmlformats.org/drawingml/2006/main" xmlns:r="http://schemas.openxmlformats.org/officeDocument/2006/relationships" xmlns:p="http://schemas.openxmlformats.org/presentationml/2006/main">
   <p:cSld>
@@ -6439,7 +7727,7 @@
         </p:nvSpPr>
         <p:spPr>
           <a:xfrm>
-            <a:off x="2736640" y="2654735"/>
+            <a:off x="2824322" y="2704839"/>
             <a:ext cx="673432" cy="963941"/>
           </a:xfrm>
           <a:prstGeom prst="can">
@@ -11136,12 +12424,12 @@
         </p:nvCxnSpPr>
         <p:spPr>
           <a:xfrm flipV="1">
-            <a:off x="3398509" y="3136706"/>
-            <a:ext cx="11563" cy="2938426"/>
+            <a:off x="3398509" y="3186810"/>
+            <a:ext cx="99245" cy="2888322"/>
           </a:xfrm>
           <a:prstGeom prst="bentConnector3">
             <a:avLst>
-              <a:gd name="adj1" fmla="val 2076996"/>
+              <a:gd name="adj1" fmla="val 330339"/>
             </a:avLst>
           </a:prstGeom>
           <a:ln>
@@ -12123,6 +13411,136 @@
           </a:p>
         </p:txBody>
       </p:sp>
+      <p:sp>
+        <p:nvSpPr>
+          <p:cNvPr id="109" name="Freccia a destra 108">
+            <a:extLst>
+              <a:ext uri="{FF2B5EF4-FFF2-40B4-BE49-F238E27FC236}">
+                <a16:creationId xmlns:a16="http://schemas.microsoft.com/office/drawing/2014/main" id="{731C6C5A-E6D0-4E3A-BFBC-DE552F40735C}"/>
+              </a:ext>
+            </a:extLst>
+          </p:cNvPr>
+          <p:cNvSpPr/>
+          <p:nvPr/>
+        </p:nvSpPr>
+        <p:spPr>
+          <a:xfrm>
+            <a:off x="10210523" y="1785976"/>
+            <a:ext cx="1155977" cy="787400"/>
+          </a:xfrm>
+          <a:prstGeom prst="rightArrow">
+            <a:avLst/>
+          </a:prstGeom>
+        </p:spPr>
+        <p:style>
+          <a:lnRef idx="2">
+            <a:schemeClr val="accent1">
+              <a:shade val="50000"/>
+            </a:schemeClr>
+          </a:lnRef>
+          <a:fillRef idx="1">
+            <a:schemeClr val="accent1"/>
+          </a:fillRef>
+          <a:effectRef idx="0">
+            <a:schemeClr val="accent1"/>
+          </a:effectRef>
+          <a:fontRef idx="minor">
+            <a:schemeClr val="lt1"/>
+          </a:fontRef>
+        </p:style>
+        <p:txBody>
+          <a:bodyPr rtlCol="0" anchor="ctr"/>
+          <a:lstStyle/>
+          <a:p>
+            <a:pPr algn="ctr"/>
+            <a:r>
+              <a:rPr lang="it-IT" dirty="0"/>
+              <a:t>EXPORT</a:t>
+            </a:r>
+          </a:p>
+        </p:txBody>
+      </p:sp>
+      <p:cxnSp>
+        <p:nvCxnSpPr>
+          <p:cNvPr id="5" name="Connettore 2 4">
+            <a:extLst>
+              <a:ext uri="{FF2B5EF4-FFF2-40B4-BE49-F238E27FC236}">
+                <a16:creationId xmlns:a16="http://schemas.microsoft.com/office/drawing/2014/main" id="{CC4E3878-1BEE-42E0-8189-64347CC2CC86}"/>
+              </a:ext>
+            </a:extLst>
+          </p:cNvPr>
+          <p:cNvCxnSpPr>
+            <a:cxnSpLocks/>
+            <a:stCxn id="51" idx="6"/>
+          </p:cNvCxnSpPr>
+          <p:nvPr/>
+        </p:nvCxnSpPr>
+        <p:spPr>
+          <a:xfrm flipV="1">
+            <a:off x="10762059" y="2362200"/>
+            <a:ext cx="0" cy="418567"/>
+          </a:xfrm>
+          <a:prstGeom prst="straightConnector1">
+            <a:avLst/>
+          </a:prstGeom>
+          <a:ln>
+            <a:tailEnd type="triangle"/>
+          </a:ln>
+        </p:spPr>
+        <p:style>
+          <a:lnRef idx="1">
+            <a:schemeClr val="accent1"/>
+          </a:lnRef>
+          <a:fillRef idx="0">
+            <a:schemeClr val="accent1"/>
+          </a:fillRef>
+          <a:effectRef idx="0">
+            <a:schemeClr val="accent1"/>
+          </a:effectRef>
+          <a:fontRef idx="minor">
+            <a:schemeClr val="tx1"/>
+          </a:fontRef>
+        </p:style>
+      </p:cxnSp>
+      <p:sp>
+        <p:nvSpPr>
+          <p:cNvPr id="113" name="CasellaDiTesto 112">
+            <a:extLst>
+              <a:ext uri="{FF2B5EF4-FFF2-40B4-BE49-F238E27FC236}">
+                <a16:creationId xmlns:a16="http://schemas.microsoft.com/office/drawing/2014/main" id="{D778BC1E-7116-476C-AFD5-F373058EC4A8}"/>
+              </a:ext>
+            </a:extLst>
+          </p:cNvPr>
+          <p:cNvSpPr txBox="1"/>
+          <p:nvPr/>
+        </p:nvSpPr>
+        <p:spPr>
+          <a:xfrm>
+            <a:off x="7194551" y="3993706"/>
+            <a:ext cx="1919196" cy="276999"/>
+          </a:xfrm>
+          <a:prstGeom prst="rect">
+            <a:avLst/>
+          </a:prstGeom>
+          <a:noFill/>
+        </p:spPr>
+        <p:txBody>
+          <a:bodyPr wrap="square" rtlCol="0">
+            <a:spAutoFit/>
+          </a:bodyPr>
+          <a:lstStyle/>
+          <a:p>
+            <a:r>
+              <a:rPr lang="it-IT" sz="1200" b="1" dirty="0">
+                <a:solidFill>
+                  <a:srgbClr val="FF0000"/>
+                </a:solidFill>
+              </a:rPr>
+              <a:t>13 DB per il calcolo</a:t>
+            </a:r>
+          </a:p>
+        </p:txBody>
+      </p:sp>
     </p:spTree>
     <p:extLst>
       <p:ext uri="{BB962C8B-B14F-4D97-AF65-F5344CB8AC3E}">
@@ -12135,6 +13553,2450 @@
   </p:clrMapOvr>
   <p:transition spd="slow">
     <p:push dir="u"/>
+  </p:transition>
+</p:sld>
+</file>
+
+<file path=ppt/slides/slide9.xml><?xml version="1.0" encoding="utf-8"?>
+<p:sld xmlns:a="http://schemas.openxmlformats.org/drawingml/2006/main" xmlns:r="http://schemas.openxmlformats.org/officeDocument/2006/relationships" xmlns:p="http://schemas.openxmlformats.org/presentationml/2006/main">
+  <p:cSld>
+    <p:spTree>
+      <p:nvGrpSpPr>
+        <p:cNvPr id="1" name=""/>
+        <p:cNvGrpSpPr/>
+        <p:nvPr/>
+      </p:nvGrpSpPr>
+      <p:grpSpPr>
+        <a:xfrm>
+          <a:off x="0" y="0"/>
+          <a:ext cx="0" cy="0"/>
+          <a:chOff x="0" y="0"/>
+          <a:chExt cx="0" cy="0"/>
+        </a:xfrm>
+      </p:grpSpPr>
+      <p:sp>
+        <p:nvSpPr>
+          <p:cNvPr id="2" name="Cilindro 1">
+            <a:extLst>
+              <a:ext uri="{FF2B5EF4-FFF2-40B4-BE49-F238E27FC236}">
+                <a16:creationId xmlns:a16="http://schemas.microsoft.com/office/drawing/2014/main" id="{9EAB16CB-EF8B-4B30-8F8A-0617F4C49D71}"/>
+              </a:ext>
+            </a:extLst>
+          </p:cNvPr>
+          <p:cNvSpPr/>
+          <p:nvPr/>
+        </p:nvSpPr>
+        <p:spPr>
+          <a:xfrm>
+            <a:off x="2638051" y="2803725"/>
+            <a:ext cx="658097" cy="963941"/>
+          </a:xfrm>
+          <a:prstGeom prst="can">
+            <a:avLst/>
+          </a:prstGeom>
+          <a:solidFill>
+            <a:schemeClr val="accent4">
+              <a:lumMod val="60000"/>
+              <a:lumOff val="40000"/>
+            </a:schemeClr>
+          </a:solidFill>
+        </p:spPr>
+        <p:style>
+          <a:lnRef idx="2">
+            <a:schemeClr val="accent1">
+              <a:shade val="50000"/>
+            </a:schemeClr>
+          </a:lnRef>
+          <a:fillRef idx="1">
+            <a:schemeClr val="accent1"/>
+          </a:fillRef>
+          <a:effectRef idx="0">
+            <a:schemeClr val="accent1"/>
+          </a:effectRef>
+          <a:fontRef idx="minor">
+            <a:schemeClr val="lt1"/>
+          </a:fontRef>
+        </p:style>
+        <p:txBody>
+          <a:bodyPr rtlCol="0" anchor="ctr"/>
+          <a:lstStyle/>
+          <a:p>
+            <a:pPr algn="ctr"/>
+            <a:r>
+              <a:rPr lang="it-IT" sz="1100" dirty="0" err="1"/>
+              <a:t>Raw</a:t>
+            </a:r>
+            <a:endParaRPr lang="it-IT" sz="1100" dirty="0"/>
+          </a:p>
+          <a:p>
+            <a:pPr algn="ctr"/>
+            <a:r>
+              <a:rPr lang="it-IT" sz="1100" dirty="0"/>
+              <a:t>Data</a:t>
+            </a:r>
+          </a:p>
+          <a:p>
+            <a:pPr algn="ctr"/>
+            <a:r>
+              <a:rPr lang="it-IT" sz="1100" dirty="0" err="1"/>
+              <a:t>Gmatica</a:t>
+            </a:r>
+            <a:endParaRPr lang="it-IT" sz="1100" dirty="0"/>
+          </a:p>
+        </p:txBody>
+      </p:sp>
+      <p:sp>
+        <p:nvSpPr>
+          <p:cNvPr id="3" name="Cubo 2">
+            <a:extLst>
+              <a:ext uri="{FF2B5EF4-FFF2-40B4-BE49-F238E27FC236}">
+                <a16:creationId xmlns:a16="http://schemas.microsoft.com/office/drawing/2014/main" id="{B6576879-8FF6-41BB-8B07-A1DF764DE35A}"/>
+              </a:ext>
+            </a:extLst>
+          </p:cNvPr>
+          <p:cNvSpPr/>
+          <p:nvPr/>
+        </p:nvSpPr>
+        <p:spPr>
+          <a:xfrm>
+            <a:off x="1525807" y="3000960"/>
+            <a:ext cx="1216152" cy="1942661"/>
+          </a:xfrm>
+          <a:prstGeom prst="cube">
+            <a:avLst/>
+          </a:prstGeom>
+          <a:solidFill>
+            <a:srgbClr val="002060"/>
+          </a:solidFill>
+        </p:spPr>
+        <p:style>
+          <a:lnRef idx="2">
+            <a:schemeClr val="accent1">
+              <a:shade val="50000"/>
+            </a:schemeClr>
+          </a:lnRef>
+          <a:fillRef idx="1">
+            <a:schemeClr val="accent1"/>
+          </a:fillRef>
+          <a:effectRef idx="0">
+            <a:schemeClr val="accent1"/>
+          </a:effectRef>
+          <a:fontRef idx="minor">
+            <a:schemeClr val="lt1"/>
+          </a:fontRef>
+        </p:style>
+        <p:txBody>
+          <a:bodyPr rtlCol="0" anchor="ctr"/>
+          <a:lstStyle/>
+          <a:p>
+            <a:pPr algn="ctr"/>
+            <a:r>
+              <a:rPr lang="it-IT" dirty="0" err="1"/>
+              <a:t>PIN01</a:t>
+            </a:r>
+            <a:endParaRPr lang="it-IT" dirty="0"/>
+          </a:p>
+          <a:p>
+            <a:pPr algn="ctr"/>
+            <a:r>
+              <a:rPr lang="it-IT" dirty="0" err="1"/>
+              <a:t>DW</a:t>
+            </a:r>
+            <a:endParaRPr lang="it-IT" dirty="0"/>
+          </a:p>
+        </p:txBody>
+      </p:sp>
+      <p:sp>
+        <p:nvSpPr>
+          <p:cNvPr id="4" name="Cilindro 3">
+            <a:extLst>
+              <a:ext uri="{FF2B5EF4-FFF2-40B4-BE49-F238E27FC236}">
+                <a16:creationId xmlns:a16="http://schemas.microsoft.com/office/drawing/2014/main" id="{5A7D6EE0-3321-4FD8-94F3-6132DBC27B84}"/>
+              </a:ext>
+            </a:extLst>
+          </p:cNvPr>
+          <p:cNvSpPr/>
+          <p:nvPr/>
+        </p:nvSpPr>
+        <p:spPr>
+          <a:xfrm>
+            <a:off x="2443352" y="4605162"/>
+            <a:ext cx="673432" cy="963941"/>
+          </a:xfrm>
+          <a:prstGeom prst="can">
+            <a:avLst/>
+          </a:prstGeom>
+          <a:solidFill>
+            <a:schemeClr val="accent4">
+              <a:lumMod val="60000"/>
+              <a:lumOff val="40000"/>
+            </a:schemeClr>
+          </a:solidFill>
+        </p:spPr>
+        <p:style>
+          <a:lnRef idx="2">
+            <a:schemeClr val="accent1">
+              <a:shade val="50000"/>
+            </a:schemeClr>
+          </a:lnRef>
+          <a:fillRef idx="1">
+            <a:schemeClr val="accent1"/>
+          </a:fillRef>
+          <a:effectRef idx="0">
+            <a:schemeClr val="accent1"/>
+          </a:effectRef>
+          <a:fontRef idx="minor">
+            <a:schemeClr val="lt1"/>
+          </a:fontRef>
+        </p:style>
+        <p:txBody>
+          <a:bodyPr rtlCol="0" anchor="ctr"/>
+          <a:lstStyle/>
+          <a:p>
+            <a:pPr algn="ctr"/>
+            <a:r>
+              <a:rPr lang="it-IT" sz="1100" dirty="0" err="1"/>
+              <a:t>Raw</a:t>
+            </a:r>
+            <a:endParaRPr lang="it-IT" sz="1100" dirty="0"/>
+          </a:p>
+          <a:p>
+            <a:pPr algn="ctr"/>
+            <a:r>
+              <a:rPr lang="it-IT" sz="1100" dirty="0"/>
+              <a:t>Data</a:t>
+            </a:r>
+          </a:p>
+          <a:p>
+            <a:pPr algn="ctr"/>
+            <a:r>
+              <a:rPr lang="it-IT" sz="1100" dirty="0"/>
+              <a:t>SISAL</a:t>
+            </a:r>
+          </a:p>
+        </p:txBody>
+      </p:sp>
+      <p:sp>
+        <p:nvSpPr>
+          <p:cNvPr id="5" name="Cilindro 4">
+            <a:extLst>
+              <a:ext uri="{FF2B5EF4-FFF2-40B4-BE49-F238E27FC236}">
+                <a16:creationId xmlns:a16="http://schemas.microsoft.com/office/drawing/2014/main" id="{978EFF54-B055-40BD-BCD2-F1C989CFFF3D}"/>
+              </a:ext>
+            </a:extLst>
+          </p:cNvPr>
+          <p:cNvSpPr/>
+          <p:nvPr/>
+        </p:nvSpPr>
+        <p:spPr>
+          <a:xfrm>
+            <a:off x="2506193" y="3673947"/>
+            <a:ext cx="658097" cy="963941"/>
+          </a:xfrm>
+          <a:prstGeom prst="can">
+            <a:avLst/>
+          </a:prstGeom>
+          <a:solidFill>
+            <a:schemeClr val="accent4">
+              <a:lumMod val="60000"/>
+              <a:lumOff val="40000"/>
+            </a:schemeClr>
+          </a:solidFill>
+        </p:spPr>
+        <p:style>
+          <a:lnRef idx="2">
+            <a:schemeClr val="accent1">
+              <a:shade val="50000"/>
+            </a:schemeClr>
+          </a:lnRef>
+          <a:fillRef idx="1">
+            <a:schemeClr val="accent1"/>
+          </a:fillRef>
+          <a:effectRef idx="0">
+            <a:schemeClr val="accent1"/>
+          </a:effectRef>
+          <a:fontRef idx="minor">
+            <a:schemeClr val="lt1"/>
+          </a:fontRef>
+        </p:style>
+        <p:txBody>
+          <a:bodyPr rtlCol="0" anchor="ctr"/>
+          <a:lstStyle/>
+          <a:p>
+            <a:pPr algn="ctr"/>
+            <a:r>
+              <a:rPr lang="it-IT" sz="1100" dirty="0" err="1"/>
+              <a:t>Raw</a:t>
+            </a:r>
+            <a:endParaRPr lang="it-IT" sz="1100" dirty="0"/>
+          </a:p>
+          <a:p>
+            <a:pPr algn="ctr"/>
+            <a:r>
+              <a:rPr lang="it-IT" sz="1100" dirty="0"/>
+              <a:t>Data</a:t>
+            </a:r>
+          </a:p>
+          <a:p>
+            <a:pPr algn="ctr"/>
+            <a:r>
+              <a:rPr lang="it-IT" sz="1100" dirty="0" err="1"/>
+              <a:t>CODERE</a:t>
+            </a:r>
+            <a:endParaRPr lang="it-IT" sz="1100" dirty="0"/>
+          </a:p>
+        </p:txBody>
+      </p:sp>
+      <p:sp>
+        <p:nvSpPr>
+          <p:cNvPr id="30" name="Titolo 1">
+            <a:extLst>
+              <a:ext uri="{FF2B5EF4-FFF2-40B4-BE49-F238E27FC236}">
+                <a16:creationId xmlns:a16="http://schemas.microsoft.com/office/drawing/2014/main" id="{15FD26AF-1907-47D3-B050-BAD4F90B880F}"/>
+              </a:ext>
+            </a:extLst>
+          </p:cNvPr>
+          <p:cNvSpPr txBox="1">
+            <a:spLocks/>
+          </p:cNvSpPr>
+          <p:nvPr/>
+        </p:nvSpPr>
+        <p:spPr>
+          <a:xfrm>
+            <a:off x="838200" y="365126"/>
+            <a:ext cx="10515600" cy="387388"/>
+          </a:xfrm>
+          <a:prstGeom prst="rect">
+            <a:avLst/>
+          </a:prstGeom>
+        </p:spPr>
+        <p:txBody>
+          <a:bodyPr>
+            <a:normAutofit fontScale="75000" lnSpcReduction="20000"/>
+          </a:bodyPr>
+          <a:lstStyle>
+            <a:lvl1pPr algn="l" defTabSz="914400" rtl="0" eaLnBrk="1" latinLnBrk="0" hangingPunct="1">
+              <a:lnSpc>
+                <a:spcPct val="90000"/>
+              </a:lnSpc>
+              <a:spcBef>
+                <a:spcPct val="0"/>
+              </a:spcBef>
+              <a:buNone/>
+              <a:defRPr sz="4400" kern="1200">
+                <a:solidFill>
+                  <a:schemeClr val="tx1"/>
+                </a:solidFill>
+                <a:latin typeface="+mj-lt"/>
+                <a:ea typeface="+mj-ea"/>
+                <a:cs typeface="+mj-cs"/>
+              </a:defRPr>
+            </a:lvl1pPr>
+          </a:lstStyle>
+          <a:p>
+            <a:pPr algn="r"/>
+            <a:r>
+              <a:rPr lang="it-IT" sz="3600" dirty="0">
+                <a:solidFill>
+                  <a:srgbClr val="C00000"/>
+                </a:solidFill>
+              </a:rPr>
+              <a:t>Assetto stadio/fase 1</a:t>
+            </a:r>
+          </a:p>
+        </p:txBody>
+      </p:sp>
+      <p:sp>
+        <p:nvSpPr>
+          <p:cNvPr id="31" name="Cubo 30">
+            <a:extLst>
+              <a:ext uri="{FF2B5EF4-FFF2-40B4-BE49-F238E27FC236}">
+                <a16:creationId xmlns:a16="http://schemas.microsoft.com/office/drawing/2014/main" id="{F41F6481-92B4-449C-ABAF-7666B89BB97C}"/>
+              </a:ext>
+            </a:extLst>
+          </p:cNvPr>
+          <p:cNvSpPr/>
+          <p:nvPr/>
+        </p:nvSpPr>
+        <p:spPr>
+          <a:xfrm>
+            <a:off x="6311788" y="2457669"/>
+            <a:ext cx="1216152" cy="1942661"/>
+          </a:xfrm>
+          <a:prstGeom prst="cube">
+            <a:avLst/>
+          </a:prstGeom>
+          <a:solidFill>
+            <a:srgbClr val="002060"/>
+          </a:solidFill>
+        </p:spPr>
+        <p:style>
+          <a:lnRef idx="2">
+            <a:schemeClr val="accent1">
+              <a:shade val="50000"/>
+            </a:schemeClr>
+          </a:lnRef>
+          <a:fillRef idx="1">
+            <a:schemeClr val="accent1"/>
+          </a:fillRef>
+          <a:effectRef idx="0">
+            <a:schemeClr val="accent1"/>
+          </a:effectRef>
+          <a:fontRef idx="minor">
+            <a:schemeClr val="lt1"/>
+          </a:fontRef>
+        </p:style>
+        <p:txBody>
+          <a:bodyPr rtlCol="0" anchor="ctr"/>
+          <a:lstStyle/>
+          <a:p>
+            <a:pPr algn="ctr"/>
+            <a:r>
+              <a:rPr lang="it-IT" dirty="0" err="1"/>
+              <a:t>POM</a:t>
+            </a:r>
+            <a:endParaRPr lang="it-IT" dirty="0"/>
+          </a:p>
+          <a:p>
+            <a:pPr algn="ctr"/>
+            <a:r>
+              <a:rPr lang="it-IT" dirty="0" err="1"/>
+              <a:t>MON</a:t>
+            </a:r>
+            <a:endParaRPr lang="it-IT" dirty="0"/>
+          </a:p>
+          <a:p>
+            <a:pPr algn="ctr"/>
+            <a:r>
+              <a:rPr lang="it-IT" dirty="0"/>
+              <a:t>01</a:t>
+            </a:r>
+          </a:p>
+        </p:txBody>
+      </p:sp>
+      <p:sp>
+        <p:nvSpPr>
+          <p:cNvPr id="32" name="Cilindro 31">
+            <a:extLst>
+              <a:ext uri="{FF2B5EF4-FFF2-40B4-BE49-F238E27FC236}">
+                <a16:creationId xmlns:a16="http://schemas.microsoft.com/office/drawing/2014/main" id="{5C1C5B84-E9DA-4711-9F29-921EBA6CA06E}"/>
+              </a:ext>
+            </a:extLst>
+          </p:cNvPr>
+          <p:cNvSpPr/>
+          <p:nvPr/>
+        </p:nvSpPr>
+        <p:spPr>
+          <a:xfrm>
+            <a:off x="8636106" y="4468068"/>
+            <a:ext cx="658096" cy="963941"/>
+          </a:xfrm>
+          <a:prstGeom prst="can">
+            <a:avLst/>
+          </a:prstGeom>
+          <a:solidFill>
+            <a:schemeClr val="accent4">
+              <a:lumMod val="60000"/>
+              <a:lumOff val="40000"/>
+            </a:schemeClr>
+          </a:solidFill>
+        </p:spPr>
+        <p:style>
+          <a:lnRef idx="2">
+            <a:schemeClr val="accent1">
+              <a:shade val="50000"/>
+            </a:schemeClr>
+          </a:lnRef>
+          <a:fillRef idx="1">
+            <a:schemeClr val="accent1"/>
+          </a:fillRef>
+          <a:effectRef idx="0">
+            <a:schemeClr val="accent1"/>
+          </a:effectRef>
+          <a:fontRef idx="minor">
+            <a:schemeClr val="lt1"/>
+          </a:fontRef>
+        </p:style>
+        <p:txBody>
+          <a:bodyPr rtlCol="0" anchor="ctr"/>
+          <a:lstStyle/>
+          <a:p>
+            <a:pPr algn="ctr"/>
+            <a:r>
+              <a:rPr lang="it-IT" sz="1100" dirty="0"/>
+              <a:t>Tickets</a:t>
+            </a:r>
+          </a:p>
+        </p:txBody>
+      </p:sp>
+      <p:sp>
+        <p:nvSpPr>
+          <p:cNvPr id="33" name="Cilindro 32">
+            <a:extLst>
+              <a:ext uri="{FF2B5EF4-FFF2-40B4-BE49-F238E27FC236}">
+                <a16:creationId xmlns:a16="http://schemas.microsoft.com/office/drawing/2014/main" id="{488703BB-5C6E-490F-AE0B-A9A9A4510581}"/>
+              </a:ext>
+            </a:extLst>
+          </p:cNvPr>
+          <p:cNvSpPr/>
+          <p:nvPr/>
+        </p:nvSpPr>
+        <p:spPr>
+          <a:xfrm>
+            <a:off x="5599208" y="4468070"/>
+            <a:ext cx="673432" cy="963941"/>
+          </a:xfrm>
+          <a:prstGeom prst="can">
+            <a:avLst/>
+          </a:prstGeom>
+          <a:solidFill>
+            <a:schemeClr val="accent4">
+              <a:lumMod val="60000"/>
+              <a:lumOff val="40000"/>
+            </a:schemeClr>
+          </a:solidFill>
+        </p:spPr>
+        <p:style>
+          <a:lnRef idx="2">
+            <a:schemeClr val="accent1">
+              <a:shade val="50000"/>
+            </a:schemeClr>
+          </a:lnRef>
+          <a:fillRef idx="1">
+            <a:schemeClr val="accent1"/>
+          </a:fillRef>
+          <a:effectRef idx="0">
+            <a:schemeClr val="accent1"/>
+          </a:effectRef>
+          <a:fontRef idx="minor">
+            <a:schemeClr val="lt1"/>
+          </a:fontRef>
+        </p:style>
+        <p:txBody>
+          <a:bodyPr rtlCol="0" anchor="ctr"/>
+          <a:lstStyle/>
+          <a:p>
+            <a:pPr algn="ctr"/>
+            <a:r>
+              <a:rPr lang="it-IT" sz="1100" dirty="0" err="1"/>
+              <a:t>Raw</a:t>
+            </a:r>
+            <a:endParaRPr lang="it-IT" sz="1100" dirty="0"/>
+          </a:p>
+          <a:p>
+            <a:pPr algn="ctr"/>
+            <a:r>
+              <a:rPr lang="it-IT" sz="1100" dirty="0"/>
+              <a:t>Data</a:t>
+            </a:r>
+          </a:p>
+          <a:p>
+            <a:pPr algn="ctr"/>
+            <a:r>
+              <a:rPr lang="it-IT" sz="1100" dirty="0"/>
+              <a:t>SISAL</a:t>
+            </a:r>
+          </a:p>
+        </p:txBody>
+      </p:sp>
+      <p:sp>
+        <p:nvSpPr>
+          <p:cNvPr id="34" name="Cilindro 33">
+            <a:extLst>
+              <a:ext uri="{FF2B5EF4-FFF2-40B4-BE49-F238E27FC236}">
+                <a16:creationId xmlns:a16="http://schemas.microsoft.com/office/drawing/2014/main" id="{AF1F13D5-6F0C-4F69-B596-05FC0B13FB2A}"/>
+              </a:ext>
+            </a:extLst>
+          </p:cNvPr>
+          <p:cNvSpPr/>
+          <p:nvPr/>
+        </p:nvSpPr>
+        <p:spPr>
+          <a:xfrm>
+            <a:off x="6386944" y="4468070"/>
+            <a:ext cx="658097" cy="963941"/>
+          </a:xfrm>
+          <a:prstGeom prst="can">
+            <a:avLst/>
+          </a:prstGeom>
+          <a:solidFill>
+            <a:schemeClr val="accent4">
+              <a:lumMod val="60000"/>
+              <a:lumOff val="40000"/>
+            </a:schemeClr>
+          </a:solidFill>
+        </p:spPr>
+        <p:style>
+          <a:lnRef idx="2">
+            <a:schemeClr val="accent1">
+              <a:shade val="50000"/>
+            </a:schemeClr>
+          </a:lnRef>
+          <a:fillRef idx="1">
+            <a:schemeClr val="accent1"/>
+          </a:fillRef>
+          <a:effectRef idx="0">
+            <a:schemeClr val="accent1"/>
+          </a:effectRef>
+          <a:fontRef idx="minor">
+            <a:schemeClr val="lt1"/>
+          </a:fontRef>
+        </p:style>
+        <p:txBody>
+          <a:bodyPr rtlCol="0" anchor="ctr"/>
+          <a:lstStyle/>
+          <a:p>
+            <a:pPr algn="ctr"/>
+            <a:r>
+              <a:rPr lang="it-IT" sz="1100" dirty="0" err="1"/>
+              <a:t>Raw</a:t>
+            </a:r>
+            <a:endParaRPr lang="it-IT" sz="1100" dirty="0"/>
+          </a:p>
+          <a:p>
+            <a:pPr algn="ctr"/>
+            <a:r>
+              <a:rPr lang="it-IT" sz="1100" dirty="0"/>
+              <a:t>Data</a:t>
+            </a:r>
+          </a:p>
+          <a:p>
+            <a:pPr algn="ctr"/>
+            <a:r>
+              <a:rPr lang="it-IT" sz="1100" dirty="0" err="1"/>
+              <a:t>Gmatica</a:t>
+            </a:r>
+            <a:endParaRPr lang="it-IT" sz="1100" dirty="0"/>
+          </a:p>
+        </p:txBody>
+      </p:sp>
+      <p:sp>
+        <p:nvSpPr>
+          <p:cNvPr id="35" name="Cilindro 34">
+            <a:extLst>
+              <a:ext uri="{FF2B5EF4-FFF2-40B4-BE49-F238E27FC236}">
+                <a16:creationId xmlns:a16="http://schemas.microsoft.com/office/drawing/2014/main" id="{299AF8F6-CC0E-45F1-8131-238193F6D8DF}"/>
+              </a:ext>
+            </a:extLst>
+          </p:cNvPr>
+          <p:cNvSpPr/>
+          <p:nvPr/>
+        </p:nvSpPr>
+        <p:spPr>
+          <a:xfrm>
+            <a:off x="7128154" y="4468069"/>
+            <a:ext cx="658097" cy="963941"/>
+          </a:xfrm>
+          <a:prstGeom prst="can">
+            <a:avLst/>
+          </a:prstGeom>
+          <a:solidFill>
+            <a:schemeClr val="accent4">
+              <a:lumMod val="60000"/>
+              <a:lumOff val="40000"/>
+            </a:schemeClr>
+          </a:solidFill>
+        </p:spPr>
+        <p:style>
+          <a:lnRef idx="2">
+            <a:schemeClr val="accent1">
+              <a:shade val="50000"/>
+            </a:schemeClr>
+          </a:lnRef>
+          <a:fillRef idx="1">
+            <a:schemeClr val="accent1"/>
+          </a:fillRef>
+          <a:effectRef idx="0">
+            <a:schemeClr val="accent1"/>
+          </a:effectRef>
+          <a:fontRef idx="minor">
+            <a:schemeClr val="lt1"/>
+          </a:fontRef>
+        </p:style>
+        <p:txBody>
+          <a:bodyPr rtlCol="0" anchor="ctr"/>
+          <a:lstStyle/>
+          <a:p>
+            <a:pPr algn="ctr"/>
+            <a:r>
+              <a:rPr lang="it-IT" sz="1100" dirty="0" err="1"/>
+              <a:t>Raw</a:t>
+            </a:r>
+            <a:endParaRPr lang="it-IT" sz="1100" dirty="0"/>
+          </a:p>
+          <a:p>
+            <a:pPr algn="ctr"/>
+            <a:r>
+              <a:rPr lang="it-IT" sz="1100" dirty="0"/>
+              <a:t>Data</a:t>
+            </a:r>
+          </a:p>
+          <a:p>
+            <a:pPr algn="ctr"/>
+            <a:r>
+              <a:rPr lang="it-IT" sz="1100" dirty="0" err="1"/>
+              <a:t>CODERE</a:t>
+            </a:r>
+            <a:endParaRPr lang="it-IT" sz="1100" dirty="0"/>
+          </a:p>
+        </p:txBody>
+      </p:sp>
+      <p:sp>
+        <p:nvSpPr>
+          <p:cNvPr id="36" name="Cilindro 35">
+            <a:extLst>
+              <a:ext uri="{FF2B5EF4-FFF2-40B4-BE49-F238E27FC236}">
+                <a16:creationId xmlns:a16="http://schemas.microsoft.com/office/drawing/2014/main" id="{F090F0CE-2871-4322-8978-5CCC8C5148E7}"/>
+              </a:ext>
+            </a:extLst>
+          </p:cNvPr>
+          <p:cNvSpPr/>
+          <p:nvPr/>
+        </p:nvSpPr>
+        <p:spPr>
+          <a:xfrm>
+            <a:off x="7881035" y="4468068"/>
+            <a:ext cx="658097" cy="963941"/>
+          </a:xfrm>
+          <a:prstGeom prst="can">
+            <a:avLst/>
+          </a:prstGeom>
+          <a:solidFill>
+            <a:schemeClr val="accent4">
+              <a:lumMod val="60000"/>
+              <a:lumOff val="40000"/>
+            </a:schemeClr>
+          </a:solidFill>
+        </p:spPr>
+        <p:style>
+          <a:lnRef idx="2">
+            <a:schemeClr val="accent1">
+              <a:shade val="50000"/>
+            </a:schemeClr>
+          </a:lnRef>
+          <a:fillRef idx="1">
+            <a:schemeClr val="accent1"/>
+          </a:fillRef>
+          <a:effectRef idx="0">
+            <a:schemeClr val="accent1"/>
+          </a:effectRef>
+          <a:fontRef idx="minor">
+            <a:schemeClr val="lt1"/>
+          </a:fontRef>
+        </p:style>
+        <p:txBody>
+          <a:bodyPr rtlCol="0" anchor="ctr"/>
+          <a:lstStyle/>
+          <a:p>
+            <a:pPr algn="ctr"/>
+            <a:r>
+              <a:rPr lang="it-IT" sz="1100" dirty="0" err="1"/>
+              <a:t>Raw</a:t>
+            </a:r>
+            <a:endParaRPr lang="it-IT" sz="1100" dirty="0"/>
+          </a:p>
+          <a:p>
+            <a:pPr algn="ctr"/>
+            <a:r>
+              <a:rPr lang="it-IT" sz="1100" dirty="0"/>
+              <a:t>Data</a:t>
+            </a:r>
+          </a:p>
+          <a:p>
+            <a:pPr algn="ctr"/>
+            <a:r>
+              <a:rPr lang="it-IT" sz="1100" dirty="0"/>
+              <a:t>…</a:t>
+            </a:r>
+          </a:p>
+        </p:txBody>
+      </p:sp>
+      <p:sp>
+        <p:nvSpPr>
+          <p:cNvPr id="45" name="Memoria interna 44">
+            <a:extLst>
+              <a:ext uri="{FF2B5EF4-FFF2-40B4-BE49-F238E27FC236}">
+                <a16:creationId xmlns:a16="http://schemas.microsoft.com/office/drawing/2014/main" id="{64E1706F-4A9D-4158-A23A-7D4383B8226F}"/>
+              </a:ext>
+            </a:extLst>
+          </p:cNvPr>
+          <p:cNvSpPr/>
+          <p:nvPr/>
+        </p:nvSpPr>
+        <p:spPr>
+          <a:xfrm>
+            <a:off x="10073128" y="4574887"/>
+            <a:ext cx="1377863" cy="1880212"/>
+          </a:xfrm>
+          <a:prstGeom prst="flowChartInternalStorage">
+            <a:avLst/>
+          </a:prstGeom>
+        </p:spPr>
+        <p:style>
+          <a:lnRef idx="2">
+            <a:schemeClr val="accent1">
+              <a:shade val="50000"/>
+            </a:schemeClr>
+          </a:lnRef>
+          <a:fillRef idx="1">
+            <a:schemeClr val="accent1"/>
+          </a:fillRef>
+          <a:effectRef idx="0">
+            <a:schemeClr val="accent1"/>
+          </a:effectRef>
+          <a:fontRef idx="minor">
+            <a:schemeClr val="lt1"/>
+          </a:fontRef>
+        </p:style>
+        <p:txBody>
+          <a:bodyPr rtlCol="0" anchor="ctr"/>
+          <a:lstStyle/>
+          <a:p>
+            <a:pPr algn="ctr"/>
+            <a:r>
+              <a:rPr lang="it-IT" dirty="0" err="1"/>
+              <a:t>Requests</a:t>
+            </a:r>
+            <a:endParaRPr lang="it-IT" dirty="0"/>
+          </a:p>
+          <a:p>
+            <a:pPr algn="ctr"/>
+            <a:endParaRPr lang="it-IT" dirty="0"/>
+          </a:p>
+          <a:p>
+            <a:pPr algn="ctr"/>
+            <a:endParaRPr lang="it-IT" dirty="0"/>
+          </a:p>
+          <a:p>
+            <a:pPr algn="ctr"/>
+            <a:endParaRPr lang="it-IT" dirty="0"/>
+          </a:p>
+          <a:p>
+            <a:pPr algn="ctr"/>
+            <a:endParaRPr lang="it-IT" dirty="0"/>
+          </a:p>
+          <a:p>
+            <a:pPr algn="ctr"/>
+            <a:endParaRPr lang="it-IT" dirty="0"/>
+          </a:p>
+          <a:p>
+            <a:pPr algn="ctr"/>
+            <a:endParaRPr lang="it-IT" dirty="0"/>
+          </a:p>
+          <a:p>
+            <a:pPr algn="ctr"/>
+            <a:endParaRPr lang="it-IT" dirty="0"/>
+          </a:p>
+        </p:txBody>
+      </p:sp>
+      <p:sp>
+        <p:nvSpPr>
+          <p:cNvPr id="46" name="Rettangolo smussato 45">
+            <a:extLst>
+              <a:ext uri="{FF2B5EF4-FFF2-40B4-BE49-F238E27FC236}">
+                <a16:creationId xmlns:a16="http://schemas.microsoft.com/office/drawing/2014/main" id="{5FD4094E-73BE-4EF2-A010-C675C52EDF22}"/>
+              </a:ext>
+            </a:extLst>
+          </p:cNvPr>
+          <p:cNvSpPr/>
+          <p:nvPr/>
+        </p:nvSpPr>
+        <p:spPr>
+          <a:xfrm>
+            <a:off x="9425813" y="2780767"/>
+            <a:ext cx="2672492" cy="1481372"/>
+          </a:xfrm>
+          <a:prstGeom prst="bevel">
+            <a:avLst/>
+          </a:prstGeom>
+        </p:spPr>
+        <p:style>
+          <a:lnRef idx="2">
+            <a:schemeClr val="accent1">
+              <a:shade val="50000"/>
+            </a:schemeClr>
+          </a:lnRef>
+          <a:fillRef idx="1">
+            <a:schemeClr val="accent1"/>
+          </a:fillRef>
+          <a:effectRef idx="0">
+            <a:schemeClr val="accent1"/>
+          </a:effectRef>
+          <a:fontRef idx="minor">
+            <a:schemeClr val="lt1"/>
+          </a:fontRef>
+        </p:style>
+        <p:txBody>
+          <a:bodyPr rtlCol="0" anchor="ctr"/>
+          <a:lstStyle/>
+          <a:p>
+            <a:pPr algn="ctr"/>
+            <a:r>
+              <a:rPr lang="it-IT" dirty="0"/>
+              <a:t>TicketInfoPoint</a:t>
+            </a:r>
+          </a:p>
+          <a:p>
+            <a:pPr algn="ctr"/>
+            <a:r>
+              <a:rPr lang="it-IT" dirty="0"/>
+              <a:t>(TIP)</a:t>
+            </a:r>
+          </a:p>
+        </p:txBody>
+      </p:sp>
+      <p:cxnSp>
+        <p:nvCxnSpPr>
+          <p:cNvPr id="47" name="Connettore 2 46">
+            <a:extLst>
+              <a:ext uri="{FF2B5EF4-FFF2-40B4-BE49-F238E27FC236}">
+                <a16:creationId xmlns:a16="http://schemas.microsoft.com/office/drawing/2014/main" id="{21510D8A-A778-4D39-BCA5-ED02B8B21AEE}"/>
+              </a:ext>
+            </a:extLst>
+          </p:cNvPr>
+          <p:cNvCxnSpPr>
+            <a:stCxn id="46" idx="2"/>
+            <a:endCxn id="45" idx="0"/>
+          </p:cNvCxnSpPr>
+          <p:nvPr/>
+        </p:nvCxnSpPr>
+        <p:spPr>
+          <a:xfrm>
+            <a:off x="10762059" y="4262139"/>
+            <a:ext cx="1" cy="312748"/>
+          </a:xfrm>
+          <a:prstGeom prst="straightConnector1">
+            <a:avLst/>
+          </a:prstGeom>
+          <a:ln>
+            <a:tailEnd type="triangle"/>
+          </a:ln>
+        </p:spPr>
+        <p:style>
+          <a:lnRef idx="1">
+            <a:schemeClr val="accent1"/>
+          </a:lnRef>
+          <a:fillRef idx="0">
+            <a:schemeClr val="accent1"/>
+          </a:fillRef>
+          <a:effectRef idx="0">
+            <a:schemeClr val="accent1"/>
+          </a:effectRef>
+          <a:fontRef idx="minor">
+            <a:schemeClr val="tx1"/>
+          </a:fontRef>
+        </p:style>
+      </p:cxnSp>
+      <p:sp>
+        <p:nvSpPr>
+          <p:cNvPr id="80" name="Cilindro 79">
+            <a:extLst>
+              <a:ext uri="{FF2B5EF4-FFF2-40B4-BE49-F238E27FC236}">
+                <a16:creationId xmlns:a16="http://schemas.microsoft.com/office/drawing/2014/main" id="{5E319F82-2D3D-4607-87E1-CC96A879E682}"/>
+              </a:ext>
+            </a:extLst>
+          </p:cNvPr>
+          <p:cNvSpPr/>
+          <p:nvPr/>
+        </p:nvSpPr>
+        <p:spPr>
+          <a:xfrm>
+            <a:off x="5803159" y="3309701"/>
+            <a:ext cx="658097" cy="963941"/>
+          </a:xfrm>
+          <a:prstGeom prst="can">
+            <a:avLst/>
+          </a:prstGeom>
+          <a:solidFill>
+            <a:schemeClr val="accent4">
+              <a:lumMod val="20000"/>
+              <a:lumOff val="80000"/>
+            </a:schemeClr>
+          </a:solidFill>
+        </p:spPr>
+        <p:style>
+          <a:lnRef idx="2">
+            <a:schemeClr val="accent1">
+              <a:shade val="50000"/>
+            </a:schemeClr>
+          </a:lnRef>
+          <a:fillRef idx="1">
+            <a:schemeClr val="accent1"/>
+          </a:fillRef>
+          <a:effectRef idx="0">
+            <a:schemeClr val="accent1"/>
+          </a:effectRef>
+          <a:fontRef idx="minor">
+            <a:schemeClr val="lt1"/>
+          </a:fontRef>
+        </p:style>
+        <p:txBody>
+          <a:bodyPr rtlCol="0" anchor="ctr"/>
+          <a:lstStyle/>
+          <a:p>
+            <a:pPr algn="ctr"/>
+            <a:r>
+              <a:rPr lang="it-IT" sz="800" b="1" dirty="0">
+                <a:solidFill>
+                  <a:schemeClr val="tx1"/>
+                </a:solidFill>
+              </a:rPr>
+              <a:t>Ticket</a:t>
+            </a:r>
+          </a:p>
+          <a:p>
+            <a:pPr algn="ctr"/>
+            <a:r>
+              <a:rPr lang="it-IT" sz="800" b="1" dirty="0">
+                <a:solidFill>
+                  <a:schemeClr val="tx1"/>
+                </a:solidFill>
+              </a:rPr>
+              <a:t>Info</a:t>
+            </a:r>
+          </a:p>
+          <a:p>
+            <a:pPr algn="ctr"/>
+            <a:r>
+              <a:rPr lang="it-IT" sz="800" b="1" dirty="0">
+                <a:solidFill>
+                  <a:schemeClr val="tx1"/>
+                </a:solidFill>
+              </a:rPr>
+              <a:t>Point</a:t>
+            </a:r>
+          </a:p>
+          <a:p>
+            <a:pPr algn="ctr"/>
+            <a:r>
+              <a:rPr lang="it-IT" sz="800" b="1" dirty="0">
+                <a:solidFill>
+                  <a:schemeClr val="tx1"/>
+                </a:solidFill>
+              </a:rPr>
+              <a:t>DB</a:t>
+            </a:r>
+          </a:p>
+        </p:txBody>
+      </p:sp>
+      <p:cxnSp>
+        <p:nvCxnSpPr>
+          <p:cNvPr id="82" name="Connettore a gomito 81">
+            <a:extLst>
+              <a:ext uri="{FF2B5EF4-FFF2-40B4-BE49-F238E27FC236}">
+                <a16:creationId xmlns:a16="http://schemas.microsoft.com/office/drawing/2014/main" id="{E8647436-B2C5-4141-893F-FF096898E8C5}"/>
+              </a:ext>
+            </a:extLst>
+          </p:cNvPr>
+          <p:cNvCxnSpPr>
+            <a:cxnSpLocks/>
+            <a:stCxn id="31" idx="0"/>
+            <a:endCxn id="3" idx="0"/>
+          </p:cNvCxnSpPr>
+          <p:nvPr/>
+        </p:nvCxnSpPr>
+        <p:spPr>
+          <a:xfrm rot="16200000" flipH="1" flipV="1">
+            <a:off x="4407247" y="336323"/>
+            <a:ext cx="543291" cy="4785981"/>
+          </a:xfrm>
+          <a:prstGeom prst="bentConnector3">
+            <a:avLst>
+              <a:gd name="adj1" fmla="val -69744"/>
+            </a:avLst>
+          </a:prstGeom>
+          <a:ln w="57150">
+            <a:solidFill>
+              <a:srgbClr val="FF0000"/>
+            </a:solidFill>
+            <a:headEnd type="triangle"/>
+            <a:tailEnd type="triangle"/>
+          </a:ln>
+        </p:spPr>
+        <p:style>
+          <a:lnRef idx="1">
+            <a:schemeClr val="accent1"/>
+          </a:lnRef>
+          <a:fillRef idx="0">
+            <a:schemeClr val="accent1"/>
+          </a:fillRef>
+          <a:effectRef idx="0">
+            <a:schemeClr val="accent1"/>
+          </a:effectRef>
+          <a:fontRef idx="minor">
+            <a:schemeClr val="tx1"/>
+          </a:fontRef>
+        </p:style>
+      </p:cxnSp>
+      <p:sp>
+        <p:nvSpPr>
+          <p:cNvPr id="87" name="Documento multiplo 86">
+            <a:extLst>
+              <a:ext uri="{FF2B5EF4-FFF2-40B4-BE49-F238E27FC236}">
+                <a16:creationId xmlns:a16="http://schemas.microsoft.com/office/drawing/2014/main" id="{790F5EE8-CEDF-4561-BBA4-F8E81633695F}"/>
+              </a:ext>
+            </a:extLst>
+          </p:cNvPr>
+          <p:cNvSpPr/>
+          <p:nvPr/>
+        </p:nvSpPr>
+        <p:spPr>
+          <a:xfrm>
+            <a:off x="5211417" y="3934298"/>
+            <a:ext cx="658096" cy="466032"/>
+          </a:xfrm>
+          <a:prstGeom prst="flowChartMultidocument">
+            <a:avLst/>
+          </a:prstGeom>
+          <a:solidFill>
+            <a:schemeClr val="accent2">
+              <a:lumMod val="75000"/>
+            </a:schemeClr>
+          </a:solidFill>
+          <a:ln>
+            <a:solidFill>
+              <a:schemeClr val="accent2">
+                <a:lumMod val="40000"/>
+                <a:lumOff val="60000"/>
+              </a:schemeClr>
+            </a:solidFill>
+          </a:ln>
+        </p:spPr>
+        <p:style>
+          <a:lnRef idx="2">
+            <a:schemeClr val="accent1">
+              <a:shade val="50000"/>
+            </a:schemeClr>
+          </a:lnRef>
+          <a:fillRef idx="1">
+            <a:schemeClr val="accent1"/>
+          </a:fillRef>
+          <a:effectRef idx="0">
+            <a:schemeClr val="accent1"/>
+          </a:effectRef>
+          <a:fontRef idx="minor">
+            <a:schemeClr val="lt1"/>
+          </a:fontRef>
+        </p:style>
+        <p:txBody>
+          <a:bodyPr rtlCol="0" anchor="ctr"/>
+          <a:lstStyle/>
+          <a:p>
+            <a:pPr algn="ctr"/>
+            <a:r>
+              <a:rPr lang="it-IT" b="1" dirty="0" err="1"/>
+              <a:t>T2U</a:t>
+            </a:r>
+            <a:endParaRPr lang="it-IT" b="1" dirty="0"/>
+          </a:p>
+        </p:txBody>
+      </p:sp>
+      <p:cxnSp>
+        <p:nvCxnSpPr>
+          <p:cNvPr id="88" name="Connettore a gomito 87">
+            <a:extLst>
+              <a:ext uri="{FF2B5EF4-FFF2-40B4-BE49-F238E27FC236}">
+                <a16:creationId xmlns:a16="http://schemas.microsoft.com/office/drawing/2014/main" id="{5DC8DFD3-EB10-43EE-B1B5-A1118F9BB6B9}"/>
+              </a:ext>
+            </a:extLst>
+          </p:cNvPr>
+          <p:cNvCxnSpPr>
+            <a:stCxn id="87" idx="3"/>
+            <a:endCxn id="33" idx="1"/>
+          </p:cNvCxnSpPr>
+          <p:nvPr/>
+        </p:nvCxnSpPr>
+        <p:spPr>
+          <a:xfrm>
+            <a:off x="5869513" y="4167314"/>
+            <a:ext cx="66411" cy="300756"/>
+          </a:xfrm>
+          <a:prstGeom prst="bentConnector2">
+            <a:avLst/>
+          </a:prstGeom>
+          <a:ln>
+            <a:solidFill>
+              <a:schemeClr val="accent2">
+                <a:lumMod val="75000"/>
+              </a:schemeClr>
+            </a:solidFill>
+            <a:headEnd type="triangle"/>
+            <a:tailEnd type="triangle"/>
+          </a:ln>
+        </p:spPr>
+        <p:style>
+          <a:lnRef idx="1">
+            <a:schemeClr val="accent1"/>
+          </a:lnRef>
+          <a:fillRef idx="0">
+            <a:schemeClr val="accent1"/>
+          </a:fillRef>
+          <a:effectRef idx="0">
+            <a:schemeClr val="accent1"/>
+          </a:effectRef>
+          <a:fontRef idx="minor">
+            <a:schemeClr val="tx1"/>
+          </a:fontRef>
+        </p:style>
+      </p:cxnSp>
+      <p:cxnSp>
+        <p:nvCxnSpPr>
+          <p:cNvPr id="89" name="Connettore a gomito 88">
+            <a:extLst>
+              <a:ext uri="{FF2B5EF4-FFF2-40B4-BE49-F238E27FC236}">
+                <a16:creationId xmlns:a16="http://schemas.microsoft.com/office/drawing/2014/main" id="{D3BEB54E-C8DC-4E84-8224-55799A166493}"/>
+              </a:ext>
+            </a:extLst>
+          </p:cNvPr>
+          <p:cNvCxnSpPr>
+            <a:cxnSpLocks/>
+            <a:stCxn id="87" idx="1"/>
+            <a:endCxn id="106" idx="4"/>
+          </p:cNvCxnSpPr>
+          <p:nvPr/>
+        </p:nvCxnSpPr>
+        <p:spPr>
+          <a:xfrm rot="10800000" flipV="1">
+            <a:off x="2959799" y="4167314"/>
+            <a:ext cx="2251619" cy="1840218"/>
+          </a:xfrm>
+          <a:prstGeom prst="bentConnector3">
+            <a:avLst>
+              <a:gd name="adj1" fmla="val 50001"/>
+            </a:avLst>
+          </a:prstGeom>
+          <a:ln>
+            <a:solidFill>
+              <a:schemeClr val="accent2">
+                <a:lumMod val="75000"/>
+              </a:schemeClr>
+            </a:solidFill>
+            <a:headEnd type="triangle"/>
+            <a:tailEnd type="triangle"/>
+          </a:ln>
+        </p:spPr>
+        <p:style>
+          <a:lnRef idx="1">
+            <a:schemeClr val="accent1"/>
+          </a:lnRef>
+          <a:fillRef idx="0">
+            <a:schemeClr val="accent1"/>
+          </a:fillRef>
+          <a:effectRef idx="0">
+            <a:schemeClr val="accent1"/>
+          </a:effectRef>
+          <a:fontRef idx="minor">
+            <a:schemeClr val="tx1"/>
+          </a:fontRef>
+        </p:style>
+      </p:cxnSp>
+      <p:cxnSp>
+        <p:nvCxnSpPr>
+          <p:cNvPr id="90" name="Connettore a gomito 89">
+            <a:extLst>
+              <a:ext uri="{FF2B5EF4-FFF2-40B4-BE49-F238E27FC236}">
+                <a16:creationId xmlns:a16="http://schemas.microsoft.com/office/drawing/2014/main" id="{1B17CE5D-9C35-448C-AB24-01EAA24A6449}"/>
+              </a:ext>
+            </a:extLst>
+          </p:cNvPr>
+          <p:cNvCxnSpPr>
+            <a:cxnSpLocks/>
+            <a:stCxn id="87" idx="1"/>
+            <a:endCxn id="5" idx="4"/>
+          </p:cNvCxnSpPr>
+          <p:nvPr/>
+        </p:nvCxnSpPr>
+        <p:spPr>
+          <a:xfrm rot="10800000">
+            <a:off x="3164291" y="4155918"/>
+            <a:ext cx="2047127" cy="11396"/>
+          </a:xfrm>
+          <a:prstGeom prst="bentConnector3">
+            <a:avLst>
+              <a:gd name="adj1" fmla="val 50000"/>
+            </a:avLst>
+          </a:prstGeom>
+          <a:ln>
+            <a:solidFill>
+              <a:schemeClr val="accent2">
+                <a:lumMod val="75000"/>
+              </a:schemeClr>
+            </a:solidFill>
+            <a:headEnd type="triangle"/>
+            <a:tailEnd type="triangle"/>
+          </a:ln>
+        </p:spPr>
+        <p:style>
+          <a:lnRef idx="1">
+            <a:schemeClr val="accent1"/>
+          </a:lnRef>
+          <a:fillRef idx="0">
+            <a:schemeClr val="accent1"/>
+          </a:fillRef>
+          <a:effectRef idx="0">
+            <a:schemeClr val="accent1"/>
+          </a:effectRef>
+          <a:fontRef idx="minor">
+            <a:schemeClr val="tx1"/>
+          </a:fontRef>
+        </p:style>
+      </p:cxnSp>
+      <p:cxnSp>
+        <p:nvCxnSpPr>
+          <p:cNvPr id="91" name="Connettore a gomito 90">
+            <a:extLst>
+              <a:ext uri="{FF2B5EF4-FFF2-40B4-BE49-F238E27FC236}">
+                <a16:creationId xmlns:a16="http://schemas.microsoft.com/office/drawing/2014/main" id="{67B60CCA-0AAE-499B-B7F2-2C839F94C693}"/>
+              </a:ext>
+            </a:extLst>
+          </p:cNvPr>
+          <p:cNvCxnSpPr>
+            <a:cxnSpLocks/>
+            <a:stCxn id="87" idx="1"/>
+            <a:endCxn id="2" idx="4"/>
+          </p:cNvCxnSpPr>
+          <p:nvPr/>
+        </p:nvCxnSpPr>
+        <p:spPr>
+          <a:xfrm rot="10800000">
+            <a:off x="3296149" y="3285696"/>
+            <a:ext cx="1915269" cy="881618"/>
+          </a:xfrm>
+          <a:prstGeom prst="bentConnector3">
+            <a:avLst>
+              <a:gd name="adj1" fmla="val 59156"/>
+            </a:avLst>
+          </a:prstGeom>
+          <a:ln>
+            <a:solidFill>
+              <a:schemeClr val="accent2">
+                <a:lumMod val="75000"/>
+              </a:schemeClr>
+            </a:solidFill>
+            <a:headEnd type="triangle"/>
+            <a:tailEnd type="triangle"/>
+          </a:ln>
+        </p:spPr>
+        <p:style>
+          <a:lnRef idx="1">
+            <a:schemeClr val="accent1"/>
+          </a:lnRef>
+          <a:fillRef idx="0">
+            <a:schemeClr val="accent1"/>
+          </a:fillRef>
+          <a:effectRef idx="0">
+            <a:schemeClr val="accent1"/>
+          </a:effectRef>
+          <a:fontRef idx="minor">
+            <a:schemeClr val="tx1"/>
+          </a:fontRef>
+        </p:style>
+      </p:cxnSp>
+      <p:cxnSp>
+        <p:nvCxnSpPr>
+          <p:cNvPr id="92" name="Connettore a gomito 91">
+            <a:extLst>
+              <a:ext uri="{FF2B5EF4-FFF2-40B4-BE49-F238E27FC236}">
+                <a16:creationId xmlns:a16="http://schemas.microsoft.com/office/drawing/2014/main" id="{0C79C198-95C0-4EFF-AA8D-626EE616E6CD}"/>
+              </a:ext>
+            </a:extLst>
+          </p:cNvPr>
+          <p:cNvCxnSpPr>
+            <a:cxnSpLocks/>
+            <a:stCxn id="87" idx="1"/>
+            <a:endCxn id="4" idx="4"/>
+          </p:cNvCxnSpPr>
+          <p:nvPr/>
+        </p:nvCxnSpPr>
+        <p:spPr>
+          <a:xfrm rot="10800000" flipV="1">
+            <a:off x="3116785" y="4167313"/>
+            <a:ext cx="2094633" cy="919819"/>
+          </a:xfrm>
+          <a:prstGeom prst="bentConnector3">
+            <a:avLst>
+              <a:gd name="adj1" fmla="val 50000"/>
+            </a:avLst>
+          </a:prstGeom>
+          <a:ln>
+            <a:solidFill>
+              <a:schemeClr val="accent2">
+                <a:lumMod val="75000"/>
+              </a:schemeClr>
+            </a:solidFill>
+            <a:headEnd type="triangle"/>
+            <a:tailEnd type="triangle"/>
+          </a:ln>
+        </p:spPr>
+        <p:style>
+          <a:lnRef idx="1">
+            <a:schemeClr val="accent1"/>
+          </a:lnRef>
+          <a:fillRef idx="0">
+            <a:schemeClr val="accent1"/>
+          </a:fillRef>
+          <a:effectRef idx="0">
+            <a:schemeClr val="accent1"/>
+          </a:effectRef>
+          <a:fontRef idx="minor">
+            <a:schemeClr val="tx1"/>
+          </a:fontRef>
+        </p:style>
+      </p:cxnSp>
+      <p:cxnSp>
+        <p:nvCxnSpPr>
+          <p:cNvPr id="93" name="Connettore a gomito 92">
+            <a:extLst>
+              <a:ext uri="{FF2B5EF4-FFF2-40B4-BE49-F238E27FC236}">
+                <a16:creationId xmlns:a16="http://schemas.microsoft.com/office/drawing/2014/main" id="{C6B51084-692A-430A-85D4-5DFC077DA0AF}"/>
+              </a:ext>
+            </a:extLst>
+          </p:cNvPr>
+          <p:cNvCxnSpPr>
+            <a:stCxn id="87" idx="3"/>
+            <a:endCxn id="34" idx="1"/>
+          </p:cNvCxnSpPr>
+          <p:nvPr/>
+        </p:nvCxnSpPr>
+        <p:spPr>
+          <a:xfrm>
+            <a:off x="5869513" y="4167314"/>
+            <a:ext cx="846480" cy="300756"/>
+          </a:xfrm>
+          <a:prstGeom prst="bentConnector2">
+            <a:avLst/>
+          </a:prstGeom>
+          <a:ln>
+            <a:solidFill>
+              <a:schemeClr val="accent2">
+                <a:lumMod val="75000"/>
+              </a:schemeClr>
+            </a:solidFill>
+            <a:headEnd type="triangle"/>
+            <a:tailEnd type="triangle"/>
+          </a:ln>
+        </p:spPr>
+        <p:style>
+          <a:lnRef idx="1">
+            <a:schemeClr val="accent1"/>
+          </a:lnRef>
+          <a:fillRef idx="0">
+            <a:schemeClr val="accent1"/>
+          </a:fillRef>
+          <a:effectRef idx="0">
+            <a:schemeClr val="accent1"/>
+          </a:effectRef>
+          <a:fontRef idx="minor">
+            <a:schemeClr val="tx1"/>
+          </a:fontRef>
+        </p:style>
+      </p:cxnSp>
+      <p:cxnSp>
+        <p:nvCxnSpPr>
+          <p:cNvPr id="94" name="Connettore a gomito 93">
+            <a:extLst>
+              <a:ext uri="{FF2B5EF4-FFF2-40B4-BE49-F238E27FC236}">
+                <a16:creationId xmlns:a16="http://schemas.microsoft.com/office/drawing/2014/main" id="{B3E41C06-398C-4940-A44F-4CDAC390887C}"/>
+              </a:ext>
+            </a:extLst>
+          </p:cNvPr>
+          <p:cNvCxnSpPr>
+            <a:stCxn id="87" idx="3"/>
+            <a:endCxn id="35" idx="1"/>
+          </p:cNvCxnSpPr>
+          <p:nvPr/>
+        </p:nvCxnSpPr>
+        <p:spPr>
+          <a:xfrm>
+            <a:off x="5869513" y="4167314"/>
+            <a:ext cx="1587690" cy="300755"/>
+          </a:xfrm>
+          <a:prstGeom prst="bentConnector2">
+            <a:avLst/>
+          </a:prstGeom>
+          <a:ln>
+            <a:solidFill>
+              <a:schemeClr val="accent2">
+                <a:lumMod val="75000"/>
+              </a:schemeClr>
+            </a:solidFill>
+            <a:headEnd type="triangle"/>
+            <a:tailEnd type="triangle"/>
+          </a:ln>
+        </p:spPr>
+        <p:style>
+          <a:lnRef idx="1">
+            <a:schemeClr val="accent1"/>
+          </a:lnRef>
+          <a:fillRef idx="0">
+            <a:schemeClr val="accent1"/>
+          </a:fillRef>
+          <a:effectRef idx="0">
+            <a:schemeClr val="accent1"/>
+          </a:effectRef>
+          <a:fontRef idx="minor">
+            <a:schemeClr val="tx1"/>
+          </a:fontRef>
+        </p:style>
+      </p:cxnSp>
+      <p:cxnSp>
+        <p:nvCxnSpPr>
+          <p:cNvPr id="95" name="Connettore a gomito 94">
+            <a:extLst>
+              <a:ext uri="{FF2B5EF4-FFF2-40B4-BE49-F238E27FC236}">
+                <a16:creationId xmlns:a16="http://schemas.microsoft.com/office/drawing/2014/main" id="{8878D82C-C9CA-41FF-B6DA-3B3D4A8ED2B2}"/>
+              </a:ext>
+            </a:extLst>
+          </p:cNvPr>
+          <p:cNvCxnSpPr>
+            <a:stCxn id="87" idx="3"/>
+            <a:endCxn id="36" idx="1"/>
+          </p:cNvCxnSpPr>
+          <p:nvPr/>
+        </p:nvCxnSpPr>
+        <p:spPr>
+          <a:xfrm>
+            <a:off x="5869513" y="4167314"/>
+            <a:ext cx="2340571" cy="300754"/>
+          </a:xfrm>
+          <a:prstGeom prst="bentConnector2">
+            <a:avLst/>
+          </a:prstGeom>
+          <a:ln>
+            <a:solidFill>
+              <a:schemeClr val="accent2">
+                <a:lumMod val="75000"/>
+              </a:schemeClr>
+            </a:solidFill>
+            <a:headEnd type="triangle"/>
+            <a:tailEnd type="triangle"/>
+          </a:ln>
+        </p:spPr>
+        <p:style>
+          <a:lnRef idx="1">
+            <a:schemeClr val="accent1"/>
+          </a:lnRef>
+          <a:fillRef idx="0">
+            <a:schemeClr val="accent1"/>
+          </a:fillRef>
+          <a:effectRef idx="0">
+            <a:schemeClr val="accent1"/>
+          </a:effectRef>
+          <a:fontRef idx="minor">
+            <a:schemeClr val="tx1"/>
+          </a:fontRef>
+        </p:style>
+      </p:cxnSp>
+      <p:sp>
+        <p:nvSpPr>
+          <p:cNvPr id="98" name="Cubo 97">
+            <a:extLst>
+              <a:ext uri="{FF2B5EF4-FFF2-40B4-BE49-F238E27FC236}">
+                <a16:creationId xmlns:a16="http://schemas.microsoft.com/office/drawing/2014/main" id="{3F9BD411-63A5-47E2-A190-463421BEF214}"/>
+              </a:ext>
+            </a:extLst>
+          </p:cNvPr>
+          <p:cNvSpPr/>
+          <p:nvPr/>
+        </p:nvSpPr>
+        <p:spPr>
+          <a:xfrm>
+            <a:off x="483534" y="905406"/>
+            <a:ext cx="1216152" cy="1942661"/>
+          </a:xfrm>
+          <a:prstGeom prst="cube">
+            <a:avLst/>
+          </a:prstGeom>
+          <a:solidFill>
+            <a:srgbClr val="002060"/>
+          </a:solidFill>
+        </p:spPr>
+        <p:style>
+          <a:lnRef idx="2">
+            <a:schemeClr val="accent1">
+              <a:shade val="50000"/>
+            </a:schemeClr>
+          </a:lnRef>
+          <a:fillRef idx="1">
+            <a:schemeClr val="accent1"/>
+          </a:fillRef>
+          <a:effectRef idx="0">
+            <a:schemeClr val="accent1"/>
+          </a:effectRef>
+          <a:fontRef idx="minor">
+            <a:schemeClr val="lt1"/>
+          </a:fontRef>
+        </p:style>
+        <p:txBody>
+          <a:bodyPr rtlCol="0" anchor="ctr"/>
+          <a:lstStyle/>
+          <a:p>
+            <a:pPr algn="ctr"/>
+            <a:r>
+              <a:rPr lang="it-IT" dirty="0"/>
+              <a:t>FI</a:t>
+            </a:r>
+          </a:p>
+          <a:p>
+            <a:pPr algn="ctr"/>
+            <a:r>
+              <a:rPr lang="it-IT" dirty="0" err="1"/>
+              <a:t>NAN</a:t>
+            </a:r>
+            <a:endParaRPr lang="it-IT" dirty="0"/>
+          </a:p>
+          <a:p>
+            <a:pPr algn="ctr"/>
+            <a:r>
+              <a:rPr lang="it-IT" dirty="0"/>
+              <a:t>CE</a:t>
+            </a:r>
+          </a:p>
+        </p:txBody>
+      </p:sp>
+      <p:sp>
+        <p:nvSpPr>
+          <p:cNvPr id="99" name="Cilindro 98">
+            <a:extLst>
+              <a:ext uri="{FF2B5EF4-FFF2-40B4-BE49-F238E27FC236}">
+                <a16:creationId xmlns:a16="http://schemas.microsoft.com/office/drawing/2014/main" id="{A4CE9A7A-BFC9-436A-842C-3DD33162F7AB}"/>
+              </a:ext>
+            </a:extLst>
+          </p:cNvPr>
+          <p:cNvSpPr/>
+          <p:nvPr/>
+        </p:nvSpPr>
+        <p:spPr>
+          <a:xfrm>
+            <a:off x="1505892" y="2084591"/>
+            <a:ext cx="576037" cy="791708"/>
+          </a:xfrm>
+          <a:prstGeom prst="can">
+            <a:avLst/>
+          </a:prstGeom>
+          <a:solidFill>
+            <a:schemeClr val="accent4">
+              <a:lumMod val="60000"/>
+              <a:lumOff val="40000"/>
+            </a:schemeClr>
+          </a:solidFill>
+        </p:spPr>
+        <p:style>
+          <a:lnRef idx="2">
+            <a:schemeClr val="accent1">
+              <a:shade val="50000"/>
+            </a:schemeClr>
+          </a:lnRef>
+          <a:fillRef idx="1">
+            <a:schemeClr val="accent1"/>
+          </a:fillRef>
+          <a:effectRef idx="0">
+            <a:schemeClr val="accent1"/>
+          </a:effectRef>
+          <a:fontRef idx="minor">
+            <a:schemeClr val="lt1"/>
+          </a:fontRef>
+        </p:style>
+        <p:txBody>
+          <a:bodyPr rtlCol="0" anchor="ctr"/>
+          <a:lstStyle/>
+          <a:p>
+            <a:pPr algn="ctr"/>
+            <a:r>
+              <a:rPr lang="it-IT" sz="1100" dirty="0"/>
+              <a:t>Tickets</a:t>
+            </a:r>
+          </a:p>
+        </p:txBody>
+      </p:sp>
+      <p:cxnSp>
+        <p:nvCxnSpPr>
+          <p:cNvPr id="100" name="Connettore a gomito 99">
+            <a:extLst>
+              <a:ext uri="{FF2B5EF4-FFF2-40B4-BE49-F238E27FC236}">
+                <a16:creationId xmlns:a16="http://schemas.microsoft.com/office/drawing/2014/main" id="{C3BD8D9C-49D6-40A5-BE55-07C946A75266}"/>
+              </a:ext>
+            </a:extLst>
+          </p:cNvPr>
+          <p:cNvCxnSpPr>
+            <a:cxnSpLocks/>
+            <a:stCxn id="87" idx="1"/>
+            <a:endCxn id="99" idx="1"/>
+          </p:cNvCxnSpPr>
+          <p:nvPr/>
+        </p:nvCxnSpPr>
+        <p:spPr>
+          <a:xfrm rot="10800000">
+            <a:off x="1793911" y="2084592"/>
+            <a:ext cx="3417506" cy="2082723"/>
+          </a:xfrm>
+          <a:prstGeom prst="bentConnector4">
+            <a:avLst>
+              <a:gd name="adj1" fmla="val 32958"/>
+              <a:gd name="adj2" fmla="val 110976"/>
+            </a:avLst>
+          </a:prstGeom>
+          <a:ln>
+            <a:solidFill>
+              <a:schemeClr val="accent2">
+                <a:lumMod val="75000"/>
+              </a:schemeClr>
+            </a:solidFill>
+            <a:headEnd type="triangle"/>
+            <a:tailEnd type="triangle"/>
+          </a:ln>
+        </p:spPr>
+        <p:style>
+          <a:lnRef idx="1">
+            <a:schemeClr val="accent1"/>
+          </a:lnRef>
+          <a:fillRef idx="0">
+            <a:schemeClr val="accent1"/>
+          </a:fillRef>
+          <a:effectRef idx="0">
+            <a:schemeClr val="accent1"/>
+          </a:effectRef>
+          <a:fontRef idx="minor">
+            <a:schemeClr val="tx1"/>
+          </a:fontRef>
+        </p:style>
+      </p:cxnSp>
+      <p:cxnSp>
+        <p:nvCxnSpPr>
+          <p:cNvPr id="101" name="Connettore a gomito 100">
+            <a:extLst>
+              <a:ext uri="{FF2B5EF4-FFF2-40B4-BE49-F238E27FC236}">
+                <a16:creationId xmlns:a16="http://schemas.microsoft.com/office/drawing/2014/main" id="{96F467CB-8A30-4B63-A1E8-794A9AD8125A}"/>
+              </a:ext>
+            </a:extLst>
+          </p:cNvPr>
+          <p:cNvCxnSpPr>
+            <a:stCxn id="31" idx="0"/>
+            <a:endCxn id="98" idx="5"/>
+          </p:cNvCxnSpPr>
+          <p:nvPr/>
+        </p:nvCxnSpPr>
+        <p:spPr>
+          <a:xfrm rot="16200000" flipV="1">
+            <a:off x="4019310" y="-594905"/>
+            <a:ext cx="732951" cy="5372197"/>
+          </a:xfrm>
+          <a:prstGeom prst="bentConnector2">
+            <a:avLst/>
+          </a:prstGeom>
+          <a:ln w="57150">
+            <a:solidFill>
+              <a:srgbClr val="FF0000"/>
+            </a:solidFill>
+            <a:headEnd type="triangle"/>
+            <a:tailEnd type="triangle"/>
+          </a:ln>
+        </p:spPr>
+        <p:style>
+          <a:lnRef idx="1">
+            <a:schemeClr val="accent1"/>
+          </a:lnRef>
+          <a:fillRef idx="0">
+            <a:schemeClr val="accent1"/>
+          </a:fillRef>
+          <a:effectRef idx="0">
+            <a:schemeClr val="accent1"/>
+          </a:effectRef>
+          <a:fontRef idx="minor">
+            <a:schemeClr val="tx1"/>
+          </a:fontRef>
+        </p:style>
+      </p:cxnSp>
+      <p:sp>
+        <p:nvSpPr>
+          <p:cNvPr id="102" name="Bolla: nuvola 101">
+            <a:extLst>
+              <a:ext uri="{FF2B5EF4-FFF2-40B4-BE49-F238E27FC236}">
+                <a16:creationId xmlns:a16="http://schemas.microsoft.com/office/drawing/2014/main" id="{40329334-CDF7-4CFD-88FC-ADAD1C77215D}"/>
+              </a:ext>
+            </a:extLst>
+          </p:cNvPr>
+          <p:cNvSpPr/>
+          <p:nvPr/>
+        </p:nvSpPr>
+        <p:spPr>
+          <a:xfrm>
+            <a:off x="4431342" y="3324544"/>
+            <a:ext cx="1183885" cy="583572"/>
+          </a:xfrm>
+          <a:prstGeom prst="cloudCallout">
+            <a:avLst>
+              <a:gd name="adj1" fmla="val 27837"/>
+              <a:gd name="adj2" fmla="val 60355"/>
+            </a:avLst>
+          </a:prstGeom>
+          <a:solidFill>
+            <a:srgbClr val="92D050"/>
+          </a:solidFill>
+        </p:spPr>
+        <p:style>
+          <a:lnRef idx="2">
+            <a:schemeClr val="accent1">
+              <a:shade val="50000"/>
+            </a:schemeClr>
+          </a:lnRef>
+          <a:fillRef idx="1">
+            <a:schemeClr val="accent1"/>
+          </a:fillRef>
+          <a:effectRef idx="0">
+            <a:schemeClr val="accent1"/>
+          </a:effectRef>
+          <a:fontRef idx="minor">
+            <a:schemeClr val="lt1"/>
+          </a:fontRef>
+        </p:style>
+        <p:txBody>
+          <a:bodyPr rtlCol="0" anchor="ctr"/>
+          <a:lstStyle/>
+          <a:p>
+            <a:pPr algn="ctr"/>
+            <a:r>
+              <a:rPr lang="it-IT" sz="800" dirty="0"/>
+              <a:t>high speed</a:t>
+            </a:r>
+          </a:p>
+          <a:p>
+            <a:pPr algn="ctr"/>
+            <a:r>
+              <a:rPr lang="it-IT" sz="800" dirty="0"/>
+              <a:t>volatile</a:t>
+            </a:r>
+          </a:p>
+          <a:p>
+            <a:pPr algn="ctr"/>
+            <a:r>
+              <a:rPr lang="it-IT" sz="800" dirty="0"/>
+              <a:t>XML objects</a:t>
+            </a:r>
+          </a:p>
+        </p:txBody>
+      </p:sp>
+      <p:sp>
+        <p:nvSpPr>
+          <p:cNvPr id="103" name="Cubo 102">
+            <a:extLst>
+              <a:ext uri="{FF2B5EF4-FFF2-40B4-BE49-F238E27FC236}">
+                <a16:creationId xmlns:a16="http://schemas.microsoft.com/office/drawing/2014/main" id="{580895F3-0463-45AF-B2DB-3D1C95B0ED6F}"/>
+              </a:ext>
+            </a:extLst>
+          </p:cNvPr>
+          <p:cNvSpPr/>
+          <p:nvPr/>
+        </p:nvSpPr>
+        <p:spPr>
+          <a:xfrm>
+            <a:off x="1386463" y="3433567"/>
+            <a:ext cx="1216152" cy="1942661"/>
+          </a:xfrm>
+          <a:prstGeom prst="cube">
+            <a:avLst/>
+          </a:prstGeom>
+          <a:solidFill>
+            <a:srgbClr val="002060"/>
+          </a:solidFill>
+        </p:spPr>
+        <p:style>
+          <a:lnRef idx="2">
+            <a:schemeClr val="accent1">
+              <a:shade val="50000"/>
+            </a:schemeClr>
+          </a:lnRef>
+          <a:fillRef idx="1">
+            <a:schemeClr val="accent1"/>
+          </a:fillRef>
+          <a:effectRef idx="0">
+            <a:schemeClr val="accent1"/>
+          </a:effectRef>
+          <a:fontRef idx="minor">
+            <a:schemeClr val="lt1"/>
+          </a:fontRef>
+        </p:style>
+        <p:txBody>
+          <a:bodyPr rtlCol="0" anchor="ctr"/>
+          <a:lstStyle/>
+          <a:p>
+            <a:pPr algn="ctr"/>
+            <a:r>
+              <a:rPr lang="it-IT" dirty="0" err="1"/>
+              <a:t>PIN01</a:t>
+            </a:r>
+            <a:endParaRPr lang="it-IT" dirty="0"/>
+          </a:p>
+          <a:p>
+            <a:pPr algn="ctr"/>
+            <a:r>
+              <a:rPr lang="it-IT" dirty="0" err="1"/>
+              <a:t>DW</a:t>
+            </a:r>
+            <a:endParaRPr lang="it-IT" dirty="0"/>
+          </a:p>
+        </p:txBody>
+      </p:sp>
+      <p:sp>
+        <p:nvSpPr>
+          <p:cNvPr id="104" name="Cubo 103">
+            <a:extLst>
+              <a:ext uri="{FF2B5EF4-FFF2-40B4-BE49-F238E27FC236}">
+                <a16:creationId xmlns:a16="http://schemas.microsoft.com/office/drawing/2014/main" id="{1CFD3C7E-D3ED-4604-A273-2EEDA9A00B0E}"/>
+              </a:ext>
+            </a:extLst>
+          </p:cNvPr>
+          <p:cNvSpPr/>
+          <p:nvPr/>
+        </p:nvSpPr>
+        <p:spPr>
+          <a:xfrm>
+            <a:off x="1360473" y="3902690"/>
+            <a:ext cx="1216152" cy="1942661"/>
+          </a:xfrm>
+          <a:prstGeom prst="cube">
+            <a:avLst/>
+          </a:prstGeom>
+          <a:solidFill>
+            <a:srgbClr val="002060"/>
+          </a:solidFill>
+        </p:spPr>
+        <p:style>
+          <a:lnRef idx="2">
+            <a:schemeClr val="accent1">
+              <a:shade val="50000"/>
+            </a:schemeClr>
+          </a:lnRef>
+          <a:fillRef idx="1">
+            <a:schemeClr val="accent1"/>
+          </a:fillRef>
+          <a:effectRef idx="0">
+            <a:schemeClr val="accent1"/>
+          </a:effectRef>
+          <a:fontRef idx="minor">
+            <a:schemeClr val="lt1"/>
+          </a:fontRef>
+        </p:style>
+        <p:txBody>
+          <a:bodyPr rtlCol="0" anchor="ctr"/>
+          <a:lstStyle/>
+          <a:p>
+            <a:pPr algn="ctr"/>
+            <a:r>
+              <a:rPr lang="it-IT" dirty="0" err="1"/>
+              <a:t>PIN01</a:t>
+            </a:r>
+            <a:endParaRPr lang="it-IT" dirty="0"/>
+          </a:p>
+          <a:p>
+            <a:pPr algn="ctr"/>
+            <a:r>
+              <a:rPr lang="it-IT" dirty="0" err="1"/>
+              <a:t>DW</a:t>
+            </a:r>
+            <a:endParaRPr lang="it-IT" dirty="0"/>
+          </a:p>
+        </p:txBody>
+      </p:sp>
+      <p:sp>
+        <p:nvSpPr>
+          <p:cNvPr id="105" name="Cubo 104">
+            <a:extLst>
+              <a:ext uri="{FF2B5EF4-FFF2-40B4-BE49-F238E27FC236}">
+                <a16:creationId xmlns:a16="http://schemas.microsoft.com/office/drawing/2014/main" id="{47C58AE4-E9F3-46D8-A669-46CF9D69843C}"/>
+              </a:ext>
+            </a:extLst>
+          </p:cNvPr>
+          <p:cNvSpPr/>
+          <p:nvPr/>
+        </p:nvSpPr>
+        <p:spPr>
+          <a:xfrm>
+            <a:off x="1220982" y="4372074"/>
+            <a:ext cx="1216152" cy="1942661"/>
+          </a:xfrm>
+          <a:prstGeom prst="cube">
+            <a:avLst/>
+          </a:prstGeom>
+          <a:solidFill>
+            <a:srgbClr val="002060"/>
+          </a:solidFill>
+        </p:spPr>
+        <p:style>
+          <a:lnRef idx="2">
+            <a:schemeClr val="accent1">
+              <a:shade val="50000"/>
+            </a:schemeClr>
+          </a:lnRef>
+          <a:fillRef idx="1">
+            <a:schemeClr val="accent1"/>
+          </a:fillRef>
+          <a:effectRef idx="0">
+            <a:schemeClr val="accent1"/>
+          </a:effectRef>
+          <a:fontRef idx="minor">
+            <a:schemeClr val="lt1"/>
+          </a:fontRef>
+        </p:style>
+        <p:txBody>
+          <a:bodyPr rtlCol="0" anchor="ctr"/>
+          <a:lstStyle/>
+          <a:p>
+            <a:pPr algn="ctr"/>
+            <a:r>
+              <a:rPr lang="it-IT" dirty="0" err="1"/>
+              <a:t>PIN01</a:t>
+            </a:r>
+            <a:endParaRPr lang="it-IT" dirty="0"/>
+          </a:p>
+          <a:p>
+            <a:pPr algn="ctr"/>
+            <a:r>
+              <a:rPr lang="it-IT" dirty="0" err="1"/>
+              <a:t>DW</a:t>
+            </a:r>
+            <a:endParaRPr lang="it-IT" dirty="0"/>
+          </a:p>
+        </p:txBody>
+      </p:sp>
+      <p:sp>
+        <p:nvSpPr>
+          <p:cNvPr id="106" name="Cilindro 105">
+            <a:extLst>
+              <a:ext uri="{FF2B5EF4-FFF2-40B4-BE49-F238E27FC236}">
+                <a16:creationId xmlns:a16="http://schemas.microsoft.com/office/drawing/2014/main" id="{BD545300-A15F-4A2D-A4E5-0874DA4A2ADA}"/>
+              </a:ext>
+            </a:extLst>
+          </p:cNvPr>
+          <p:cNvSpPr/>
+          <p:nvPr/>
+        </p:nvSpPr>
+        <p:spPr>
+          <a:xfrm>
+            <a:off x="2301701" y="5525561"/>
+            <a:ext cx="658097" cy="963941"/>
+          </a:xfrm>
+          <a:prstGeom prst="can">
+            <a:avLst/>
+          </a:prstGeom>
+          <a:solidFill>
+            <a:schemeClr val="accent4">
+              <a:lumMod val="60000"/>
+              <a:lumOff val="40000"/>
+            </a:schemeClr>
+          </a:solidFill>
+        </p:spPr>
+        <p:style>
+          <a:lnRef idx="2">
+            <a:schemeClr val="accent1">
+              <a:shade val="50000"/>
+            </a:schemeClr>
+          </a:lnRef>
+          <a:fillRef idx="1">
+            <a:schemeClr val="accent1"/>
+          </a:fillRef>
+          <a:effectRef idx="0">
+            <a:schemeClr val="accent1"/>
+          </a:effectRef>
+          <a:fontRef idx="minor">
+            <a:schemeClr val="lt1"/>
+          </a:fontRef>
+        </p:style>
+        <p:txBody>
+          <a:bodyPr rtlCol="0" anchor="ctr"/>
+          <a:lstStyle/>
+          <a:p>
+            <a:pPr algn="ctr"/>
+            <a:r>
+              <a:rPr lang="it-IT" sz="1100" dirty="0" err="1"/>
+              <a:t>Raw</a:t>
+            </a:r>
+            <a:endParaRPr lang="it-IT" sz="1100" dirty="0"/>
+          </a:p>
+          <a:p>
+            <a:pPr algn="ctr"/>
+            <a:r>
+              <a:rPr lang="it-IT" sz="1100" dirty="0"/>
+              <a:t>Data</a:t>
+            </a:r>
+          </a:p>
+          <a:p>
+            <a:pPr algn="ctr"/>
+            <a:r>
+              <a:rPr lang="it-IT" sz="1100" dirty="0"/>
+              <a:t>…</a:t>
+            </a:r>
+          </a:p>
+        </p:txBody>
+      </p:sp>
+      <p:sp>
+        <p:nvSpPr>
+          <p:cNvPr id="107" name="CasellaDiTesto 106">
+            <a:extLst>
+              <a:ext uri="{FF2B5EF4-FFF2-40B4-BE49-F238E27FC236}">
+                <a16:creationId xmlns:a16="http://schemas.microsoft.com/office/drawing/2014/main" id="{003D710E-0EF2-46E5-967B-633B46263766}"/>
+              </a:ext>
+            </a:extLst>
+          </p:cNvPr>
+          <p:cNvSpPr txBox="1"/>
+          <p:nvPr/>
+        </p:nvSpPr>
+        <p:spPr>
+          <a:xfrm>
+            <a:off x="7175329" y="1604049"/>
+            <a:ext cx="1919196" cy="276999"/>
+          </a:xfrm>
+          <a:prstGeom prst="rect">
+            <a:avLst/>
+          </a:prstGeom>
+          <a:noFill/>
+        </p:spPr>
+        <p:txBody>
+          <a:bodyPr wrap="square" rtlCol="0">
+            <a:spAutoFit/>
+          </a:bodyPr>
+          <a:lstStyle/>
+          <a:p>
+            <a:r>
+              <a:rPr lang="it-IT" sz="1200" b="1" dirty="0">
+                <a:solidFill>
+                  <a:srgbClr val="FF0000"/>
+                </a:solidFill>
+              </a:rPr>
+              <a:t>13 </a:t>
+            </a:r>
+            <a:r>
+              <a:rPr lang="it-IT" sz="1200" b="1" dirty="0" err="1">
+                <a:solidFill>
+                  <a:srgbClr val="FF0000"/>
+                </a:solidFill>
+              </a:rPr>
+              <a:t>Linked</a:t>
+            </a:r>
+            <a:r>
+              <a:rPr lang="it-IT" sz="1200" b="1" dirty="0">
+                <a:solidFill>
+                  <a:srgbClr val="FF0000"/>
+                </a:solidFill>
+              </a:rPr>
+              <a:t> </a:t>
+            </a:r>
+            <a:r>
+              <a:rPr lang="it-IT" sz="1200" b="1" dirty="0" err="1">
+                <a:solidFill>
+                  <a:srgbClr val="FF0000"/>
+                </a:solidFill>
+              </a:rPr>
+              <a:t>servers</a:t>
+            </a:r>
+            <a:endParaRPr lang="it-IT" sz="1200" b="1" dirty="0">
+              <a:solidFill>
+                <a:srgbClr val="FF0000"/>
+              </a:solidFill>
+            </a:endParaRPr>
+          </a:p>
+        </p:txBody>
+      </p:sp>
+      <p:sp>
+        <p:nvSpPr>
+          <p:cNvPr id="108" name="CasellaDiTesto 107">
+            <a:extLst>
+              <a:ext uri="{FF2B5EF4-FFF2-40B4-BE49-F238E27FC236}">
+                <a16:creationId xmlns:a16="http://schemas.microsoft.com/office/drawing/2014/main" id="{672C1BB9-022D-41CE-B59B-6ECA54EE4F6E}"/>
+              </a:ext>
+            </a:extLst>
+          </p:cNvPr>
+          <p:cNvSpPr txBox="1"/>
+          <p:nvPr/>
+        </p:nvSpPr>
+        <p:spPr>
+          <a:xfrm>
+            <a:off x="534483" y="5059414"/>
+            <a:ext cx="622286" cy="261610"/>
+          </a:xfrm>
+          <a:prstGeom prst="rect">
+            <a:avLst/>
+          </a:prstGeom>
+          <a:noFill/>
+        </p:spPr>
+        <p:txBody>
+          <a:bodyPr wrap="none" rtlCol="0">
+            <a:spAutoFit/>
+          </a:bodyPr>
+          <a:lstStyle/>
+          <a:p>
+            <a:r>
+              <a:rPr lang="it-IT" sz="1100" b="1" dirty="0">
+                <a:solidFill>
+                  <a:schemeClr val="accent1">
+                    <a:lumMod val="50000"/>
+                  </a:schemeClr>
+                </a:solidFill>
+              </a:rPr>
+              <a:t>13 </a:t>
+            </a:r>
+            <a:r>
+              <a:rPr lang="it-IT" sz="1100" b="1" dirty="0" err="1">
+                <a:solidFill>
+                  <a:schemeClr val="accent1">
+                    <a:lumMod val="50000"/>
+                  </a:schemeClr>
+                </a:solidFill>
+              </a:rPr>
+              <a:t>PINs</a:t>
+            </a:r>
+            <a:endParaRPr lang="it-IT" sz="1100" b="1" dirty="0">
+              <a:solidFill>
+                <a:schemeClr val="accent1">
+                  <a:lumMod val="50000"/>
+                </a:schemeClr>
+              </a:solidFill>
+            </a:endParaRPr>
+          </a:p>
+        </p:txBody>
+      </p:sp>
+      <p:cxnSp>
+        <p:nvCxnSpPr>
+          <p:cNvPr id="157" name="Connettore a gomito 156">
+            <a:extLst>
+              <a:ext uri="{FF2B5EF4-FFF2-40B4-BE49-F238E27FC236}">
+                <a16:creationId xmlns:a16="http://schemas.microsoft.com/office/drawing/2014/main" id="{BA14BE7C-B339-47AE-9AF5-A154F4871A48}"/>
+              </a:ext>
+            </a:extLst>
+          </p:cNvPr>
+          <p:cNvCxnSpPr>
+            <a:cxnSpLocks/>
+            <a:stCxn id="32" idx="1"/>
+            <a:endCxn id="87" idx="3"/>
+          </p:cNvCxnSpPr>
+          <p:nvPr/>
+        </p:nvCxnSpPr>
+        <p:spPr>
+          <a:xfrm rot="16200000" flipV="1">
+            <a:off x="7266957" y="2769870"/>
+            <a:ext cx="300754" cy="3095641"/>
+          </a:xfrm>
+          <a:prstGeom prst="bentConnector2">
+            <a:avLst/>
+          </a:prstGeom>
+          <a:ln>
+            <a:solidFill>
+              <a:schemeClr val="accent2">
+                <a:lumMod val="75000"/>
+              </a:schemeClr>
+            </a:solidFill>
+            <a:headEnd type="triangle"/>
+            <a:tailEnd type="triangle"/>
+          </a:ln>
+        </p:spPr>
+        <p:style>
+          <a:lnRef idx="1">
+            <a:schemeClr val="accent1"/>
+          </a:lnRef>
+          <a:fillRef idx="0">
+            <a:schemeClr val="accent1"/>
+          </a:fillRef>
+          <a:effectRef idx="0">
+            <a:schemeClr val="accent1"/>
+          </a:effectRef>
+          <a:fontRef idx="minor">
+            <a:schemeClr val="tx1"/>
+          </a:fontRef>
+        </p:style>
+      </p:cxnSp>
+      <p:cxnSp>
+        <p:nvCxnSpPr>
+          <p:cNvPr id="161" name="Connettore a gomito 160">
+            <a:extLst>
+              <a:ext uri="{FF2B5EF4-FFF2-40B4-BE49-F238E27FC236}">
+                <a16:creationId xmlns:a16="http://schemas.microsoft.com/office/drawing/2014/main" id="{E8C41A7B-7C27-4702-BEFE-5D5E276E78A9}"/>
+              </a:ext>
+            </a:extLst>
+          </p:cNvPr>
+          <p:cNvCxnSpPr>
+            <a:cxnSpLocks/>
+            <a:stCxn id="87" idx="2"/>
+            <a:endCxn id="45" idx="1"/>
+          </p:cNvCxnSpPr>
+          <p:nvPr/>
+        </p:nvCxnSpPr>
+        <p:spPr>
+          <a:xfrm rot="16200000" flipH="1">
+            <a:off x="7217759" y="2659624"/>
+            <a:ext cx="1132312" cy="4578425"/>
+          </a:xfrm>
+          <a:prstGeom prst="bentConnector2">
+            <a:avLst/>
+          </a:prstGeom>
+          <a:ln>
+            <a:solidFill>
+              <a:schemeClr val="accent2">
+                <a:lumMod val="75000"/>
+              </a:schemeClr>
+            </a:solidFill>
+            <a:headEnd type="triangle"/>
+            <a:tailEnd type="triangle"/>
+          </a:ln>
+        </p:spPr>
+        <p:style>
+          <a:lnRef idx="1">
+            <a:schemeClr val="accent1"/>
+          </a:lnRef>
+          <a:fillRef idx="0">
+            <a:schemeClr val="accent1"/>
+          </a:fillRef>
+          <a:effectRef idx="0">
+            <a:schemeClr val="accent1"/>
+          </a:effectRef>
+          <a:fontRef idx="minor">
+            <a:schemeClr val="tx1"/>
+          </a:fontRef>
+        </p:style>
+      </p:cxnSp>
+      <p:sp>
+        <p:nvSpPr>
+          <p:cNvPr id="167" name="Freccia a destra 166">
+            <a:extLst>
+              <a:ext uri="{FF2B5EF4-FFF2-40B4-BE49-F238E27FC236}">
+                <a16:creationId xmlns:a16="http://schemas.microsoft.com/office/drawing/2014/main" id="{EA21B5FE-CDB4-4B55-B8F3-C29159E4BE31}"/>
+              </a:ext>
+            </a:extLst>
+          </p:cNvPr>
+          <p:cNvSpPr/>
+          <p:nvPr/>
+        </p:nvSpPr>
+        <p:spPr>
+          <a:xfrm>
+            <a:off x="10208527" y="1789031"/>
+            <a:ext cx="1155977" cy="787400"/>
+          </a:xfrm>
+          <a:prstGeom prst="rightArrow">
+            <a:avLst/>
+          </a:prstGeom>
+        </p:spPr>
+        <p:style>
+          <a:lnRef idx="2">
+            <a:schemeClr val="accent1">
+              <a:shade val="50000"/>
+            </a:schemeClr>
+          </a:lnRef>
+          <a:fillRef idx="1">
+            <a:schemeClr val="accent1"/>
+          </a:fillRef>
+          <a:effectRef idx="0">
+            <a:schemeClr val="accent1"/>
+          </a:effectRef>
+          <a:fontRef idx="minor">
+            <a:schemeClr val="lt1"/>
+          </a:fontRef>
+        </p:style>
+        <p:txBody>
+          <a:bodyPr rtlCol="0" anchor="ctr"/>
+          <a:lstStyle/>
+          <a:p>
+            <a:pPr algn="ctr"/>
+            <a:r>
+              <a:rPr lang="it-IT" dirty="0"/>
+              <a:t>EXPORT</a:t>
+            </a:r>
+          </a:p>
+        </p:txBody>
+      </p:sp>
+      <p:cxnSp>
+        <p:nvCxnSpPr>
+          <p:cNvPr id="173" name="Connettore 2 172">
+            <a:extLst>
+              <a:ext uri="{FF2B5EF4-FFF2-40B4-BE49-F238E27FC236}">
+                <a16:creationId xmlns:a16="http://schemas.microsoft.com/office/drawing/2014/main" id="{DBF08BF5-C317-4A20-B507-65CCC56D592B}"/>
+              </a:ext>
+            </a:extLst>
+          </p:cNvPr>
+          <p:cNvCxnSpPr>
+            <a:cxnSpLocks/>
+            <a:stCxn id="46" idx="6"/>
+          </p:cNvCxnSpPr>
+          <p:nvPr/>
+        </p:nvCxnSpPr>
+        <p:spPr>
+          <a:xfrm flipV="1">
+            <a:off x="10762059" y="2381250"/>
+            <a:ext cx="0" cy="399517"/>
+          </a:xfrm>
+          <a:prstGeom prst="straightConnector1">
+            <a:avLst/>
+          </a:prstGeom>
+          <a:ln>
+            <a:tailEnd type="triangle"/>
+          </a:ln>
+        </p:spPr>
+        <p:style>
+          <a:lnRef idx="1">
+            <a:schemeClr val="accent1"/>
+          </a:lnRef>
+          <a:fillRef idx="0">
+            <a:schemeClr val="accent1"/>
+          </a:fillRef>
+          <a:effectRef idx="0">
+            <a:schemeClr val="accent1"/>
+          </a:effectRef>
+          <a:fontRef idx="minor">
+            <a:schemeClr val="tx1"/>
+          </a:fontRef>
+        </p:style>
+      </p:cxnSp>
+      <p:sp>
+        <p:nvSpPr>
+          <p:cNvPr id="218" name="CasellaDiTesto 217">
+            <a:extLst>
+              <a:ext uri="{FF2B5EF4-FFF2-40B4-BE49-F238E27FC236}">
+                <a16:creationId xmlns:a16="http://schemas.microsoft.com/office/drawing/2014/main" id="{54C0A393-D4D8-4B40-B298-E1023DB39362}"/>
+              </a:ext>
+            </a:extLst>
+          </p:cNvPr>
+          <p:cNvSpPr txBox="1"/>
+          <p:nvPr/>
+        </p:nvSpPr>
+        <p:spPr>
+          <a:xfrm>
+            <a:off x="4639832" y="2971498"/>
+            <a:ext cx="1919196" cy="276999"/>
+          </a:xfrm>
+          <a:prstGeom prst="rect">
+            <a:avLst/>
+          </a:prstGeom>
+          <a:noFill/>
+        </p:spPr>
+        <p:txBody>
+          <a:bodyPr wrap="square" rtlCol="0">
+            <a:spAutoFit/>
+          </a:bodyPr>
+          <a:lstStyle/>
+          <a:p>
+            <a:r>
+              <a:rPr lang="it-IT" sz="1200" b="1" dirty="0">
+                <a:solidFill>
+                  <a:schemeClr val="accent6">
+                    <a:lumMod val="75000"/>
+                  </a:schemeClr>
+                </a:solidFill>
+              </a:rPr>
+              <a:t>1 solo DB per il calcolo</a:t>
+            </a:r>
+          </a:p>
+        </p:txBody>
+      </p:sp>
+    </p:spTree>
+    <p:extLst>
+      <p:ext uri="{BB962C8B-B14F-4D97-AF65-F5344CB8AC3E}">
+        <p14:creationId xmlns:p14="http://schemas.microsoft.com/office/powerpoint/2010/main" val="356397697"/>
+      </p:ext>
+    </p:extLst>
+  </p:cSld>
+  <p:clrMapOvr>
+    <a:masterClrMapping/>
+  </p:clrMapOvr>
+  <p:transition spd="slow">
+    <p:cover/>
   </p:transition>
 </p:sld>
 </file>

</xml_diff>